<commit_message>
Added screenshots of different development steps.
</commit_message>
<xml_diff>
--- a/Lectures/Byte 3 Mobile Part 2.pptx
+++ b/Lectures/Byte 3 Mobile Part 2.pptx
@@ -5,10 +5,10 @@
     <p:sldMasterId id="2147483648" r:id="rId1"/>
   </p:sldMasterIdLst>
   <p:notesMasterIdLst>
-    <p:notesMasterId r:id="rId14"/>
+    <p:notesMasterId r:id="rId25"/>
   </p:notesMasterIdLst>
   <p:handoutMasterIdLst>
-    <p:handoutMasterId r:id="rId15"/>
+    <p:handoutMasterId r:id="rId26"/>
   </p:handoutMasterIdLst>
   <p:sldIdLst>
     <p:sldId id="256" r:id="rId2"/>
@@ -22,7 +22,18 @@
     <p:sldId id="342" r:id="rId10"/>
     <p:sldId id="331" r:id="rId11"/>
     <p:sldId id="332" r:id="rId12"/>
-    <p:sldId id="329" r:id="rId13"/>
+    <p:sldId id="343" r:id="rId13"/>
+    <p:sldId id="329" r:id="rId14"/>
+    <p:sldId id="344" r:id="rId15"/>
+    <p:sldId id="345" r:id="rId16"/>
+    <p:sldId id="346" r:id="rId17"/>
+    <p:sldId id="347" r:id="rId18"/>
+    <p:sldId id="348" r:id="rId19"/>
+    <p:sldId id="349" r:id="rId20"/>
+    <p:sldId id="350" r:id="rId21"/>
+    <p:sldId id="351" r:id="rId22"/>
+    <p:sldId id="352" r:id="rId23"/>
+    <p:sldId id="353" r:id="rId24"/>
   </p:sldIdLst>
   <p:sldSz cx="9144000" cy="6858000" type="screen4x3"/>
   <p:notesSz cx="6858000" cy="9144000"/>
@@ -9299,12 +9310,6 @@
               <a:t>-mobile to your Shell using the upload feature in your Shell.</a:t>
             </a:r>
           </a:p>
-          <a:p>
-            <a:r>
-              <a:rPr lang="en-US" dirty="0" smtClean="0"/>
-              <a:t>Once you setup the files in your document hierarchy the way you want you can start modifying the code.</a:t>
-            </a:r>
-          </a:p>
         </p:txBody>
       </p:sp>
       <p:pic>
@@ -9329,7 +9334,7 @@
         </p:blipFill>
         <p:spPr>
           <a:xfrm>
-            <a:off x="3843151" y="4554958"/>
+            <a:off x="2443314" y="3782759"/>
             <a:ext cx="4420061" cy="1852906"/>
           </a:xfrm>
           <a:prstGeom prst="rect">
@@ -9341,6 +9346,713 @@
     <p:extLst>
       <p:ext uri="{BB962C8B-B14F-4D97-AF65-F5344CB8AC3E}">
         <p14:creationId xmlns:p14="http://schemas.microsoft.com/office/powerpoint/2010/main" val="197040318"/>
+      </p:ext>
+    </p:extLst>
+  </p:cSld>
+  <p:clrMapOvr>
+    <a:masterClrMapping/>
+  </p:clrMapOvr>
+  <p:timing>
+    <p:tnLst>
+      <p:par>
+        <p:cTn id="1" dur="indefinite" restart="never" nodeType="tmRoot"/>
+      </p:par>
+    </p:tnLst>
+  </p:timing>
+</p:sld>
+</file>
+
+<file path=ppt/slides/slide12.xml><?xml version="1.0" encoding="utf-8"?>
+<p:sld xmlns:a="http://schemas.openxmlformats.org/drawingml/2006/main" xmlns:r="http://schemas.openxmlformats.org/officeDocument/2006/relationships" xmlns:p="http://schemas.openxmlformats.org/presentationml/2006/main">
+  <p:cSld>
+    <p:spTree>
+      <p:nvGrpSpPr>
+        <p:cNvPr id="1" name=""/>
+        <p:cNvGrpSpPr/>
+        <p:nvPr/>
+      </p:nvGrpSpPr>
+      <p:grpSpPr>
+        <a:xfrm>
+          <a:off x="0" y="0"/>
+          <a:ext cx="0" cy="0"/>
+          <a:chOff x="0" y="0"/>
+          <a:chExt cx="0" cy="0"/>
+        </a:xfrm>
+      </p:grpSpPr>
+      <p:sp>
+        <p:nvSpPr>
+          <p:cNvPr id="2" name="Title 1"/>
+          <p:cNvSpPr>
+            <a:spLocks noGrp="1"/>
+          </p:cNvSpPr>
+          <p:nvPr>
+            <p:ph type="title"/>
+          </p:nvPr>
+        </p:nvSpPr>
+        <p:spPr/>
+        <p:txBody>
+          <a:bodyPr/>
+          <a:lstStyle/>
+          <a:p>
+            <a:r>
+              <a:rPr lang="en-US" dirty="0" smtClean="0"/>
+              <a:t>Developing Code</a:t>
+            </a:r>
+            <a:endParaRPr lang="en-US" dirty="0"/>
+          </a:p>
+        </p:txBody>
+      </p:sp>
+      <p:sp>
+        <p:nvSpPr>
+          <p:cNvPr id="4" name="Date Placeholder 3"/>
+          <p:cNvSpPr>
+            <a:spLocks noGrp="1"/>
+          </p:cNvSpPr>
+          <p:nvPr>
+            <p:ph type="dt" sz="half" idx="10"/>
+          </p:nvPr>
+        </p:nvSpPr>
+        <p:spPr/>
+        <p:txBody>
+          <a:bodyPr/>
+          <a:lstStyle/>
+          <a:p>
+            <a:fld id="{7053BEFA-1175-F644-B249-7D41D72BD3FF}" type="datetime1">
+              <a:rPr lang="en-US" smtClean="0"/>
+              <a:t>2/15/17</a:t>
+            </a:fld>
+            <a:endParaRPr lang="en-US" dirty="0"/>
+          </a:p>
+        </p:txBody>
+      </p:sp>
+      <p:sp>
+        <p:nvSpPr>
+          <p:cNvPr id="5" name="Footer Placeholder 4"/>
+          <p:cNvSpPr>
+            <a:spLocks noGrp="1"/>
+          </p:cNvSpPr>
+          <p:nvPr>
+            <p:ph type="ftr" sz="quarter" idx="11"/>
+          </p:nvPr>
+        </p:nvSpPr>
+        <p:spPr/>
+        <p:txBody>
+          <a:bodyPr/>
+          <a:lstStyle/>
+          <a:p>
+            <a:endParaRPr lang="en-US" dirty="0"/>
+          </a:p>
+        </p:txBody>
+      </p:sp>
+      <p:sp>
+        <p:nvSpPr>
+          <p:cNvPr id="6" name="Slide Number Placeholder 5"/>
+          <p:cNvSpPr>
+            <a:spLocks noGrp="1"/>
+          </p:cNvSpPr>
+          <p:nvPr>
+            <p:ph type="sldNum" sz="quarter" idx="12"/>
+          </p:nvPr>
+        </p:nvSpPr>
+        <p:spPr/>
+        <p:txBody>
+          <a:bodyPr/>
+          <a:lstStyle/>
+          <a:p>
+            <a:fld id="{17E276FA-8F89-B34D-A726-BE3FA1F8DD97}" type="slidenum">
+              <a:rPr lang="en-US" smtClean="0"/>
+              <a:t>12</a:t>
+            </a:fld>
+            <a:endParaRPr lang="en-US" dirty="0"/>
+          </a:p>
+        </p:txBody>
+      </p:sp>
+      <p:sp>
+        <p:nvSpPr>
+          <p:cNvPr id="3" name="Content Placeholder 2"/>
+          <p:cNvSpPr>
+            <a:spLocks noGrp="1"/>
+          </p:cNvSpPr>
+          <p:nvPr>
+            <p:ph idx="1"/>
+          </p:nvPr>
+        </p:nvSpPr>
+        <p:spPr/>
+        <p:txBody>
+          <a:bodyPr/>
+          <a:lstStyle/>
+          <a:p>
+            <a:r>
+              <a:rPr lang="en-US" dirty="0" smtClean="0"/>
+              <a:t>Once you setup the files in your document hierarchy the way you want you can start modifying the code in the Editor.</a:t>
+            </a:r>
+          </a:p>
+        </p:txBody>
+      </p:sp>
+      <p:pic>
+        <p:nvPicPr>
+          <p:cNvPr id="7" name="Picture 6"/>
+          <p:cNvPicPr>
+            <a:picLocks noChangeAspect="1"/>
+          </p:cNvPicPr>
+          <p:nvPr/>
+        </p:nvPicPr>
+        <p:blipFill>
+          <a:blip r:embed="rId2">
+            <a:extLst>
+              <a:ext uri="{28A0092B-C50C-407E-A947-70E740481C1C}">
+                <a14:useLocalDpi xmlns:a14="http://schemas.microsoft.com/office/drawing/2010/main" val="0"/>
+              </a:ext>
+            </a:extLst>
+          </a:blip>
+          <a:stretch>
+            <a:fillRect/>
+          </a:stretch>
+        </p:blipFill>
+        <p:spPr>
+          <a:xfrm>
+            <a:off x="2256312" y="3262746"/>
+            <a:ext cx="4631377" cy="3145117"/>
+          </a:xfrm>
+          <a:prstGeom prst="rect">
+            <a:avLst/>
+          </a:prstGeom>
+        </p:spPr>
+      </p:pic>
+    </p:spTree>
+    <p:extLst>
+      <p:ext uri="{BB962C8B-B14F-4D97-AF65-F5344CB8AC3E}">
+        <p14:creationId xmlns:p14="http://schemas.microsoft.com/office/powerpoint/2010/main" val="404944475"/>
+      </p:ext>
+    </p:extLst>
+  </p:cSld>
+  <p:clrMapOvr>
+    <a:masterClrMapping/>
+  </p:clrMapOvr>
+  <p:timing>
+    <p:tnLst>
+      <p:par>
+        <p:cTn id="1" dur="indefinite" restart="never" nodeType="tmRoot"/>
+      </p:par>
+    </p:tnLst>
+  </p:timing>
+</p:sld>
+</file>
+
+<file path=ppt/slides/slide13.xml><?xml version="1.0" encoding="utf-8"?>
+<p:sld xmlns:a="http://schemas.openxmlformats.org/drawingml/2006/main" xmlns:r="http://schemas.openxmlformats.org/officeDocument/2006/relationships" xmlns:p="http://schemas.openxmlformats.org/presentationml/2006/main">
+  <p:cSld>
+    <p:spTree>
+      <p:nvGrpSpPr>
+        <p:cNvPr id="1" name=""/>
+        <p:cNvGrpSpPr/>
+        <p:nvPr/>
+      </p:nvGrpSpPr>
+      <p:grpSpPr>
+        <a:xfrm>
+          <a:off x="0" y="0"/>
+          <a:ext cx="0" cy="0"/>
+          <a:chOff x="0" y="0"/>
+          <a:chExt cx="0" cy="0"/>
+        </a:xfrm>
+      </p:grpSpPr>
+      <p:sp>
+        <p:nvSpPr>
+          <p:cNvPr id="2" name="Title 1"/>
+          <p:cNvSpPr>
+            <a:spLocks noGrp="1"/>
+          </p:cNvSpPr>
+          <p:nvPr>
+            <p:ph type="title"/>
+          </p:nvPr>
+        </p:nvSpPr>
+        <p:spPr/>
+        <p:txBody>
+          <a:bodyPr/>
+          <a:lstStyle/>
+          <a:p>
+            <a:r>
+              <a:rPr lang="en-US" dirty="0" smtClean="0"/>
+              <a:t>Developing Code</a:t>
+            </a:r>
+            <a:endParaRPr lang="en-US" dirty="0"/>
+          </a:p>
+        </p:txBody>
+      </p:sp>
+      <p:sp>
+        <p:nvSpPr>
+          <p:cNvPr id="4" name="Date Placeholder 3"/>
+          <p:cNvSpPr>
+            <a:spLocks noGrp="1"/>
+          </p:cNvSpPr>
+          <p:nvPr>
+            <p:ph type="dt" sz="half" idx="10"/>
+          </p:nvPr>
+        </p:nvSpPr>
+        <p:spPr/>
+        <p:txBody>
+          <a:bodyPr/>
+          <a:lstStyle/>
+          <a:p>
+            <a:fld id="{7053BEFA-1175-F644-B249-7D41D72BD3FF}" type="datetime1">
+              <a:rPr lang="en-US" smtClean="0"/>
+              <a:t>2/15/17</a:t>
+            </a:fld>
+            <a:endParaRPr lang="en-US"/>
+          </a:p>
+        </p:txBody>
+      </p:sp>
+      <p:sp>
+        <p:nvSpPr>
+          <p:cNvPr id="5" name="Footer Placeholder 4"/>
+          <p:cNvSpPr>
+            <a:spLocks noGrp="1"/>
+          </p:cNvSpPr>
+          <p:nvPr>
+            <p:ph type="ftr" sz="quarter" idx="11"/>
+          </p:nvPr>
+        </p:nvSpPr>
+        <p:spPr/>
+        <p:txBody>
+          <a:bodyPr/>
+          <a:lstStyle/>
+          <a:p>
+            <a:endParaRPr lang="en-US" dirty="0"/>
+          </a:p>
+        </p:txBody>
+      </p:sp>
+      <p:sp>
+        <p:nvSpPr>
+          <p:cNvPr id="6" name="Slide Number Placeholder 5"/>
+          <p:cNvSpPr>
+            <a:spLocks noGrp="1"/>
+          </p:cNvSpPr>
+          <p:nvPr>
+            <p:ph type="sldNum" sz="quarter" idx="12"/>
+          </p:nvPr>
+        </p:nvSpPr>
+        <p:spPr/>
+        <p:txBody>
+          <a:bodyPr/>
+          <a:lstStyle/>
+          <a:p>
+            <a:fld id="{17E276FA-8F89-B34D-A726-BE3FA1F8DD97}" type="slidenum">
+              <a:rPr lang="en-US" smtClean="0"/>
+              <a:t>13</a:t>
+            </a:fld>
+            <a:endParaRPr lang="en-US" dirty="0"/>
+          </a:p>
+        </p:txBody>
+      </p:sp>
+      <p:sp>
+        <p:nvSpPr>
+          <p:cNvPr id="9" name="Content Placeholder 8"/>
+          <p:cNvSpPr>
+            <a:spLocks noGrp="1"/>
+          </p:cNvSpPr>
+          <p:nvPr>
+            <p:ph idx="1"/>
+          </p:nvPr>
+        </p:nvSpPr>
+        <p:spPr/>
+        <p:txBody>
+          <a:bodyPr/>
+          <a:lstStyle/>
+          <a:p>
+            <a:r>
+              <a:rPr lang="en-US" dirty="0" smtClean="0"/>
+              <a:t>Deploy the code. By default, if you have location and activity data you should see:</a:t>
+            </a:r>
+            <a:endParaRPr lang="en-US" dirty="0"/>
+          </a:p>
+        </p:txBody>
+      </p:sp>
+      <p:pic>
+        <p:nvPicPr>
+          <p:cNvPr id="10" name="Picture 9"/>
+          <p:cNvPicPr>
+            <a:picLocks noChangeAspect="1"/>
+          </p:cNvPicPr>
+          <p:nvPr/>
+        </p:nvPicPr>
+        <p:blipFill>
+          <a:blip r:embed="rId2">
+            <a:extLst>
+              <a:ext uri="{28A0092B-C50C-407E-A947-70E740481C1C}">
+                <a14:useLocalDpi xmlns:a14="http://schemas.microsoft.com/office/drawing/2010/main" val="0"/>
+              </a:ext>
+            </a:extLst>
+          </a:blip>
+          <a:stretch>
+            <a:fillRect/>
+          </a:stretch>
+        </p:blipFill>
+        <p:spPr>
+          <a:xfrm>
+            <a:off x="1996381" y="2838008"/>
+            <a:ext cx="5151238" cy="3569855"/>
+          </a:xfrm>
+          <a:prstGeom prst="rect">
+            <a:avLst/>
+          </a:prstGeom>
+        </p:spPr>
+      </p:pic>
+    </p:spTree>
+    <p:extLst>
+      <p:ext uri="{BB962C8B-B14F-4D97-AF65-F5344CB8AC3E}">
+        <p14:creationId xmlns:p14="http://schemas.microsoft.com/office/powerpoint/2010/main" val="521541758"/>
+      </p:ext>
+    </p:extLst>
+  </p:cSld>
+  <p:clrMapOvr>
+    <a:masterClrMapping/>
+  </p:clrMapOvr>
+  <p:timing>
+    <p:tnLst>
+      <p:par>
+        <p:cTn id="1" dur="indefinite" restart="never" nodeType="tmRoot"/>
+      </p:par>
+    </p:tnLst>
+  </p:timing>
+</p:sld>
+</file>
+
+<file path=ppt/slides/slide14.xml><?xml version="1.0" encoding="utf-8"?>
+<p:sld xmlns:a="http://schemas.openxmlformats.org/drawingml/2006/main" xmlns:r="http://schemas.openxmlformats.org/officeDocument/2006/relationships" xmlns:p="http://schemas.openxmlformats.org/presentationml/2006/main">
+  <p:cSld>
+    <p:spTree>
+      <p:nvGrpSpPr>
+        <p:cNvPr id="1" name=""/>
+        <p:cNvGrpSpPr/>
+        <p:nvPr/>
+      </p:nvGrpSpPr>
+      <p:grpSpPr>
+        <a:xfrm>
+          <a:off x="0" y="0"/>
+          <a:ext cx="0" cy="0"/>
+          <a:chOff x="0" y="0"/>
+          <a:chExt cx="0" cy="0"/>
+        </a:xfrm>
+      </p:grpSpPr>
+      <p:sp>
+        <p:nvSpPr>
+          <p:cNvPr id="2" name="Title 1"/>
+          <p:cNvSpPr>
+            <a:spLocks noGrp="1"/>
+          </p:cNvSpPr>
+          <p:nvPr>
+            <p:ph type="title"/>
+          </p:nvPr>
+        </p:nvSpPr>
+        <p:spPr/>
+        <p:txBody>
+          <a:bodyPr/>
+          <a:lstStyle/>
+          <a:p>
+            <a:r>
+              <a:rPr lang="en-US" dirty="0" smtClean="0"/>
+              <a:t>Developing Code</a:t>
+            </a:r>
+            <a:endParaRPr lang="en-US" dirty="0"/>
+          </a:p>
+        </p:txBody>
+      </p:sp>
+      <p:sp>
+        <p:nvSpPr>
+          <p:cNvPr id="4" name="Date Placeholder 3"/>
+          <p:cNvSpPr>
+            <a:spLocks noGrp="1"/>
+          </p:cNvSpPr>
+          <p:nvPr>
+            <p:ph type="dt" sz="half" idx="10"/>
+          </p:nvPr>
+        </p:nvSpPr>
+        <p:spPr/>
+        <p:txBody>
+          <a:bodyPr/>
+          <a:lstStyle/>
+          <a:p>
+            <a:fld id="{7053BEFA-1175-F644-B249-7D41D72BD3FF}" type="datetime1">
+              <a:rPr lang="en-US" smtClean="0"/>
+              <a:t>2/15/17</a:t>
+            </a:fld>
+            <a:endParaRPr lang="en-US"/>
+          </a:p>
+        </p:txBody>
+      </p:sp>
+      <p:sp>
+        <p:nvSpPr>
+          <p:cNvPr id="5" name="Footer Placeholder 4"/>
+          <p:cNvSpPr>
+            <a:spLocks noGrp="1"/>
+          </p:cNvSpPr>
+          <p:nvPr>
+            <p:ph type="ftr" sz="quarter" idx="11"/>
+          </p:nvPr>
+        </p:nvSpPr>
+        <p:spPr/>
+        <p:txBody>
+          <a:bodyPr/>
+          <a:lstStyle/>
+          <a:p>
+            <a:endParaRPr lang="en-US" dirty="0"/>
+          </a:p>
+        </p:txBody>
+      </p:sp>
+      <p:sp>
+        <p:nvSpPr>
+          <p:cNvPr id="6" name="Slide Number Placeholder 5"/>
+          <p:cNvSpPr>
+            <a:spLocks noGrp="1"/>
+          </p:cNvSpPr>
+          <p:nvPr>
+            <p:ph type="sldNum" sz="quarter" idx="12"/>
+          </p:nvPr>
+        </p:nvSpPr>
+        <p:spPr/>
+        <p:txBody>
+          <a:bodyPr/>
+          <a:lstStyle/>
+          <a:p>
+            <a:fld id="{17E276FA-8F89-B34D-A726-BE3FA1F8DD97}" type="slidenum">
+              <a:rPr lang="en-US" smtClean="0"/>
+              <a:t>14</a:t>
+            </a:fld>
+            <a:endParaRPr lang="en-US" dirty="0"/>
+          </a:p>
+        </p:txBody>
+      </p:sp>
+      <p:sp>
+        <p:nvSpPr>
+          <p:cNvPr id="9" name="Content Placeholder 8"/>
+          <p:cNvSpPr>
+            <a:spLocks noGrp="1"/>
+          </p:cNvSpPr>
+          <p:nvPr>
+            <p:ph idx="1"/>
+          </p:nvPr>
+        </p:nvSpPr>
+        <p:spPr/>
+        <p:txBody>
+          <a:bodyPr/>
+          <a:lstStyle/>
+          <a:p>
+            <a:r>
+              <a:rPr lang="en-US" dirty="0" smtClean="0"/>
+              <a:t>Vega-lite has an editor that helps you edit the JSON and see example. Click on “Open in Vega Editor” to see it.</a:t>
+            </a:r>
+            <a:endParaRPr lang="en-US" dirty="0"/>
+          </a:p>
+        </p:txBody>
+      </p:sp>
+      <p:pic>
+        <p:nvPicPr>
+          <p:cNvPr id="3" name="Picture 2"/>
+          <p:cNvPicPr>
+            <a:picLocks noChangeAspect="1"/>
+          </p:cNvPicPr>
+          <p:nvPr/>
+        </p:nvPicPr>
+        <p:blipFill>
+          <a:blip r:embed="rId2">
+            <a:extLst>
+              <a:ext uri="{28A0092B-C50C-407E-A947-70E740481C1C}">
+                <a14:useLocalDpi xmlns:a14="http://schemas.microsoft.com/office/drawing/2010/main" val="0"/>
+              </a:ext>
+            </a:extLst>
+          </a:blip>
+          <a:stretch>
+            <a:fillRect/>
+          </a:stretch>
+        </p:blipFill>
+        <p:spPr>
+          <a:xfrm>
+            <a:off x="2498466" y="3177776"/>
+            <a:ext cx="3843164" cy="3230088"/>
+          </a:xfrm>
+          <a:prstGeom prst="rect">
+            <a:avLst/>
+          </a:prstGeom>
+        </p:spPr>
+      </p:pic>
+      <p:sp>
+        <p:nvSpPr>
+          <p:cNvPr id="7" name="Rectangle 6"/>
+          <p:cNvSpPr/>
+          <p:nvPr/>
+        </p:nvSpPr>
+        <p:spPr>
+          <a:xfrm>
+            <a:off x="2470068" y="3348842"/>
+            <a:ext cx="2470067" cy="1805049"/>
+          </a:xfrm>
+          <a:prstGeom prst="rect">
+            <a:avLst/>
+          </a:prstGeom>
+          <a:noFill/>
+          <a:ln w="76200"/>
+        </p:spPr>
+        <p:style>
+          <a:lnRef idx="1">
+            <a:schemeClr val="accent1"/>
+          </a:lnRef>
+          <a:fillRef idx="3">
+            <a:schemeClr val="accent1"/>
+          </a:fillRef>
+          <a:effectRef idx="2">
+            <a:schemeClr val="accent1"/>
+          </a:effectRef>
+          <a:fontRef idx="minor">
+            <a:schemeClr val="lt1"/>
+          </a:fontRef>
+        </p:style>
+        <p:txBody>
+          <a:bodyPr rtlCol="0" anchor="ctr"/>
+          <a:lstStyle/>
+          <a:p>
+            <a:pPr algn="ctr"/>
+            <a:r>
+              <a:rPr lang="en-US" dirty="0" smtClean="0">
+                <a:solidFill>
+                  <a:schemeClr val="tx1">
+                    <a:lumMod val="85000"/>
+                    <a:lumOff val="15000"/>
+                  </a:schemeClr>
+                </a:solidFill>
+              </a:rPr>
+              <a:t>DATA</a:t>
+            </a:r>
+            <a:endParaRPr lang="en-US" dirty="0">
+              <a:solidFill>
+                <a:schemeClr val="tx1">
+                  <a:lumMod val="85000"/>
+                  <a:lumOff val="15000"/>
+                </a:schemeClr>
+              </a:solidFill>
+            </a:endParaRPr>
+          </a:p>
+        </p:txBody>
+      </p:sp>
+      <p:sp>
+        <p:nvSpPr>
+          <p:cNvPr id="11" name="Rectangle 10"/>
+          <p:cNvSpPr/>
+          <p:nvPr/>
+        </p:nvSpPr>
+        <p:spPr>
+          <a:xfrm>
+            <a:off x="2470067" y="5211548"/>
+            <a:ext cx="2470067" cy="1186647"/>
+          </a:xfrm>
+          <a:prstGeom prst="rect">
+            <a:avLst/>
+          </a:prstGeom>
+          <a:noFill/>
+          <a:ln w="76200"/>
+        </p:spPr>
+        <p:style>
+          <a:lnRef idx="1">
+            <a:schemeClr val="accent1"/>
+          </a:lnRef>
+          <a:fillRef idx="3">
+            <a:schemeClr val="accent1"/>
+          </a:fillRef>
+          <a:effectRef idx="2">
+            <a:schemeClr val="accent1"/>
+          </a:effectRef>
+          <a:fontRef idx="minor">
+            <a:schemeClr val="lt1"/>
+          </a:fontRef>
+        </p:style>
+        <p:txBody>
+          <a:bodyPr rtlCol="0" anchor="ctr"/>
+          <a:lstStyle/>
+          <a:p>
+            <a:pPr algn="ctr"/>
+            <a:r>
+              <a:rPr lang="en-US" dirty="0" smtClean="0">
+                <a:solidFill>
+                  <a:schemeClr val="tx1">
+                    <a:lumMod val="85000"/>
+                    <a:lumOff val="15000"/>
+                  </a:schemeClr>
+                </a:solidFill>
+              </a:rPr>
+              <a:t>VISUALIZATION DEFINITION</a:t>
+            </a:r>
+            <a:endParaRPr lang="en-US" dirty="0">
+              <a:solidFill>
+                <a:schemeClr val="tx1">
+                  <a:lumMod val="85000"/>
+                  <a:lumOff val="15000"/>
+                </a:schemeClr>
+              </a:solidFill>
+            </a:endParaRPr>
+          </a:p>
+        </p:txBody>
+      </p:sp>
+      <p:sp>
+        <p:nvSpPr>
+          <p:cNvPr id="12" name="Rectangle 11"/>
+          <p:cNvSpPr/>
+          <p:nvPr/>
+        </p:nvSpPr>
+        <p:spPr>
+          <a:xfrm>
+            <a:off x="4968533" y="3177776"/>
+            <a:ext cx="2470067" cy="1805049"/>
+          </a:xfrm>
+          <a:prstGeom prst="rect">
+            <a:avLst/>
+          </a:prstGeom>
+          <a:noFill/>
+          <a:ln w="76200"/>
+        </p:spPr>
+        <p:style>
+          <a:lnRef idx="1">
+            <a:schemeClr val="accent1"/>
+          </a:lnRef>
+          <a:fillRef idx="3">
+            <a:schemeClr val="accent1"/>
+          </a:fillRef>
+          <a:effectRef idx="2">
+            <a:schemeClr val="accent1"/>
+          </a:effectRef>
+          <a:fontRef idx="minor">
+            <a:schemeClr val="lt1"/>
+          </a:fontRef>
+        </p:style>
+        <p:txBody>
+          <a:bodyPr rtlCol="0" anchor="ctr"/>
+          <a:lstStyle/>
+          <a:p>
+            <a:pPr algn="ctr"/>
+            <a:r>
+              <a:rPr lang="en-US" dirty="0" smtClean="0">
+                <a:solidFill>
+                  <a:schemeClr val="tx1">
+                    <a:lumMod val="85000"/>
+                    <a:lumOff val="15000"/>
+                  </a:schemeClr>
+                </a:solidFill>
+              </a:rPr>
+              <a:t>VISUALIZATION</a:t>
+            </a:r>
+            <a:endParaRPr lang="en-US" dirty="0">
+              <a:solidFill>
+                <a:schemeClr val="tx1">
+                  <a:lumMod val="85000"/>
+                  <a:lumOff val="15000"/>
+                </a:schemeClr>
+              </a:solidFill>
+            </a:endParaRPr>
+          </a:p>
+        </p:txBody>
+      </p:sp>
+    </p:spTree>
+    <p:extLst>
+      <p:ext uri="{BB962C8B-B14F-4D97-AF65-F5344CB8AC3E}">
+        <p14:creationId xmlns:p14="http://schemas.microsoft.com/office/powerpoint/2010/main" val="790843198"/>
       </p:ext>
     </p:extLst>
   </p:cSld>
@@ -9368,7 +10080,7 @@
                             </p:stCondLst>
                             <p:childTnLst>
                               <p:par>
-                                <p:cTn id="5" presetID="1" presetClass="entr" presetSubtype="0" fill="hold" nodeType="clickEffect">
+                                <p:cTn id="5" presetID="1" presetClass="entr" presetSubtype="0" fill="hold" grpId="0" nodeType="clickEffect">
                                   <p:stCondLst>
                                     <p:cond delay="0"/>
                                   </p:stCondLst>
@@ -9381,11 +10093,97 @@
                                           </p:stCondLst>
                                         </p:cTn>
                                         <p:tgtEl>
-                                          <p:spTgt spid="3">
-                                            <p:txEl>
-                                              <p:pRg st="1" end="1"/>
-                                            </p:txEl>
-                                          </p:spTgt>
+                                          <p:spTgt spid="7"/>
+                                        </p:tgtEl>
+                                        <p:attrNameLst>
+                                          <p:attrName>style.visibility</p:attrName>
+                                        </p:attrNameLst>
+                                      </p:cBhvr>
+                                      <p:to>
+                                        <p:strVal val="visible"/>
+                                      </p:to>
+                                    </p:set>
+                                  </p:childTnLst>
+                                </p:cTn>
+                              </p:par>
+                            </p:childTnLst>
+                          </p:cTn>
+                        </p:par>
+                      </p:childTnLst>
+                    </p:cTn>
+                  </p:par>
+                  <p:par>
+                    <p:cTn id="7" fill="hold">
+                      <p:stCondLst>
+                        <p:cond delay="indefinite"/>
+                      </p:stCondLst>
+                      <p:childTnLst>
+                        <p:par>
+                          <p:cTn id="8" fill="hold">
+                            <p:stCondLst>
+                              <p:cond delay="0"/>
+                            </p:stCondLst>
+                            <p:childTnLst>
+                              <p:par>
+                                <p:cTn id="9" presetID="1" presetClass="entr" presetSubtype="0" fill="hold" grpId="0" nodeType="clickEffect">
+                                  <p:stCondLst>
+                                    <p:cond delay="0"/>
+                                  </p:stCondLst>
+                                  <p:childTnLst>
+                                    <p:set>
+                                      <p:cBhvr>
+                                        <p:cTn id="10" dur="1" fill="hold">
+                                          <p:stCondLst>
+                                            <p:cond delay="0"/>
+                                          </p:stCondLst>
+                                        </p:cTn>
+                                        <p:tgtEl>
+                                          <p:spTgt spid="11"/>
+                                        </p:tgtEl>
+                                        <p:attrNameLst>
+                                          <p:attrName>style.visibility</p:attrName>
+                                        </p:attrNameLst>
+                                      </p:cBhvr>
+                                      <p:to>
+                                        <p:strVal val="visible"/>
+                                      </p:to>
+                                    </p:set>
+                                  </p:childTnLst>
+                                </p:cTn>
+                              </p:par>
+                            </p:childTnLst>
+                          </p:cTn>
+                        </p:par>
+                      </p:childTnLst>
+                    </p:cTn>
+                  </p:par>
+                  <p:par>
+                    <p:cTn id="11" fill="hold">
+                      <p:stCondLst>
+                        <p:cond delay="indefinite"/>
+                      </p:stCondLst>
+                      <p:childTnLst>
+                        <p:par>
+                          <p:cTn id="12" fill="hold">
+                            <p:stCondLst>
+                              <p:cond delay="0"/>
+                            </p:stCondLst>
+                            <p:childTnLst>
+                              <p:par>
+                                <p:cTn id="13" presetID="1" presetClass="entr" presetSubtype="0" fill="hold" grpId="0" nodeType="clickEffect">
+                                  <p:stCondLst>
+                                    <p:cond delay="0"/>
+                                  </p:stCondLst>
+                                  <p:childTnLst>
+                                    <p:set>
+                                      <p:cBhvr>
+                                        <p:cTn id="14" dur="1" fill="hold">
+                                          <p:stCondLst>
+                                            <p:cond delay="0"/>
+                                          </p:stCondLst>
+                                        </p:cTn>
+                                        <p:tgtEl>
+                                          <p:spTgt spid="12"/>
                                         </p:tgtEl>
                                         <p:attrNameLst>
                                           <p:attrName>style.visibility</p:attrName>
@@ -9425,11 +10223,16 @@
         </p:cTn>
       </p:par>
     </p:tnLst>
+    <p:bldLst>
+      <p:bldP spid="7" grpId="0" animBg="1"/>
+      <p:bldP spid="11" grpId="0" animBg="1"/>
+      <p:bldP spid="12" grpId="0" animBg="1"/>
+    </p:bldLst>
   </p:timing>
 </p:sld>
 </file>
 
-<file path=ppt/slides/slide12.xml><?xml version="1.0" encoding="utf-8"?>
+<file path=ppt/slides/slide15.xml><?xml version="1.0" encoding="utf-8"?>
 <p:sld xmlns:a="http://schemas.openxmlformats.org/drawingml/2006/main" xmlns:r="http://schemas.openxmlformats.org/officeDocument/2006/relationships" xmlns:p="http://schemas.openxmlformats.org/presentationml/2006/main">
   <p:cSld>
     <p:spTree>
@@ -9463,7 +10266,7 @@
           <a:p>
             <a:r>
               <a:rPr lang="en-US" dirty="0" smtClean="0"/>
-              <a:t>Byte 3 Demo!</a:t>
+              <a:t>Developing Code</a:t>
             </a:r>
             <a:endParaRPr lang="en-US" dirty="0"/>
           </a:p>
@@ -9528,7 +10331,7 @@
           <a:p>
             <a:fld id="{17E276FA-8F89-B34D-A726-BE3FA1F8DD97}" type="slidenum">
               <a:rPr lang="en-US" smtClean="0"/>
-              <a:t>12</a:t>
+              <a:t>15</a:t>
             </a:fld>
             <a:endParaRPr lang="en-US" dirty="0"/>
           </a:p>
@@ -9551,16 +10354,1430 @@
           <a:p>
             <a:r>
               <a:rPr lang="en-US" dirty="0" smtClean="0"/>
-              <a:t>Let’s do it together now.</a:t>
+              <a:t>You can also see examples:</a:t>
             </a:r>
             <a:endParaRPr lang="en-US" dirty="0"/>
           </a:p>
         </p:txBody>
       </p:sp>
+      <p:pic>
+        <p:nvPicPr>
+          <p:cNvPr id="3" name="Picture 2"/>
+          <p:cNvPicPr>
+            <a:picLocks noChangeAspect="1"/>
+          </p:cNvPicPr>
+          <p:nvPr/>
+        </p:nvPicPr>
+        <p:blipFill>
+          <a:blip r:embed="rId2">
+            <a:extLst>
+              <a:ext uri="{28A0092B-C50C-407E-A947-70E740481C1C}">
+                <a14:useLocalDpi xmlns:a14="http://schemas.microsoft.com/office/drawing/2010/main" val="0"/>
+              </a:ext>
+            </a:extLst>
+          </a:blip>
+          <a:stretch>
+            <a:fillRect/>
+          </a:stretch>
+        </p:blipFill>
+        <p:spPr>
+          <a:xfrm>
+            <a:off x="2498466" y="3177776"/>
+            <a:ext cx="3843164" cy="3230088"/>
+          </a:xfrm>
+          <a:prstGeom prst="rect">
+            <a:avLst/>
+          </a:prstGeom>
+        </p:spPr>
+      </p:pic>
+      <p:sp>
+        <p:nvSpPr>
+          <p:cNvPr id="11" name="Rectangle 10"/>
+          <p:cNvSpPr/>
+          <p:nvPr/>
+        </p:nvSpPr>
+        <p:spPr>
+          <a:xfrm>
+            <a:off x="3185015" y="2997042"/>
+            <a:ext cx="1600742" cy="565555"/>
+          </a:xfrm>
+          <a:prstGeom prst="rect">
+            <a:avLst/>
+          </a:prstGeom>
+          <a:noFill/>
+          <a:ln w="76200"/>
+        </p:spPr>
+        <p:style>
+          <a:lnRef idx="1">
+            <a:schemeClr val="accent1"/>
+          </a:lnRef>
+          <a:fillRef idx="3">
+            <a:schemeClr val="accent1"/>
+          </a:fillRef>
+          <a:effectRef idx="2">
+            <a:schemeClr val="accent1"/>
+          </a:effectRef>
+          <a:fontRef idx="minor">
+            <a:schemeClr val="lt1"/>
+          </a:fontRef>
+        </p:style>
+        <p:txBody>
+          <a:bodyPr rtlCol="0" anchor="ctr"/>
+          <a:lstStyle/>
+          <a:p>
+            <a:pPr algn="ctr"/>
+            <a:endParaRPr lang="en-US" dirty="0">
+              <a:solidFill>
+                <a:schemeClr val="tx1">
+                  <a:lumMod val="85000"/>
+                  <a:lumOff val="15000"/>
+                </a:schemeClr>
+              </a:solidFill>
+            </a:endParaRPr>
+          </a:p>
+        </p:txBody>
+      </p:sp>
+      <p:pic>
+        <p:nvPicPr>
+          <p:cNvPr id="8" name="Picture 7"/>
+          <p:cNvPicPr>
+            <a:picLocks noChangeAspect="1"/>
+          </p:cNvPicPr>
+          <p:nvPr/>
+        </p:nvPicPr>
+        <p:blipFill>
+          <a:blip r:embed="rId3">
+            <a:extLst>
+              <a:ext uri="{28A0092B-C50C-407E-A947-70E740481C1C}">
+                <a14:useLocalDpi xmlns:a14="http://schemas.microsoft.com/office/drawing/2010/main" val="0"/>
+              </a:ext>
+            </a:extLst>
+          </a:blip>
+          <a:stretch>
+            <a:fillRect/>
+          </a:stretch>
+        </p:blipFill>
+        <p:spPr>
+          <a:xfrm>
+            <a:off x="287435" y="2448285"/>
+            <a:ext cx="8265226" cy="3203133"/>
+          </a:xfrm>
+          <a:prstGeom prst="rect">
+            <a:avLst/>
+          </a:prstGeom>
+        </p:spPr>
+      </p:pic>
     </p:spTree>
     <p:extLst>
       <p:ext uri="{BB962C8B-B14F-4D97-AF65-F5344CB8AC3E}">
-        <p14:creationId xmlns:p14="http://schemas.microsoft.com/office/powerpoint/2010/main" val="521541758"/>
+        <p14:creationId xmlns:p14="http://schemas.microsoft.com/office/powerpoint/2010/main" val="56824755"/>
+      </p:ext>
+    </p:extLst>
+  </p:cSld>
+  <p:clrMapOvr>
+    <a:masterClrMapping/>
+  </p:clrMapOvr>
+  <p:timing>
+    <p:tnLst>
+      <p:par>
+        <p:cTn id="1" dur="indefinite" restart="never" nodeType="tmRoot">
+          <p:childTnLst>
+            <p:seq concurrent="1" nextAc="seek">
+              <p:cTn id="2" dur="indefinite" nodeType="mainSeq">
+                <p:childTnLst>
+                  <p:par>
+                    <p:cTn id="3" fill="hold">
+                      <p:stCondLst>
+                        <p:cond delay="indefinite"/>
+                      </p:stCondLst>
+                      <p:childTnLst>
+                        <p:par>
+                          <p:cTn id="4" fill="hold">
+                            <p:stCondLst>
+                              <p:cond delay="0"/>
+                            </p:stCondLst>
+                            <p:childTnLst>
+                              <p:par>
+                                <p:cTn id="5" presetID="1" presetClass="entr" presetSubtype="0" fill="hold" grpId="0" nodeType="clickEffect">
+                                  <p:stCondLst>
+                                    <p:cond delay="0"/>
+                                  </p:stCondLst>
+                                  <p:childTnLst>
+                                    <p:set>
+                                      <p:cBhvr>
+                                        <p:cTn id="6" dur="1" fill="hold">
+                                          <p:stCondLst>
+                                            <p:cond delay="0"/>
+                                          </p:stCondLst>
+                                        </p:cTn>
+                                        <p:tgtEl>
+                                          <p:spTgt spid="11"/>
+                                        </p:tgtEl>
+                                        <p:attrNameLst>
+                                          <p:attrName>style.visibility</p:attrName>
+                                        </p:attrNameLst>
+                                      </p:cBhvr>
+                                      <p:to>
+                                        <p:strVal val="visible"/>
+                                      </p:to>
+                                    </p:set>
+                                  </p:childTnLst>
+                                </p:cTn>
+                              </p:par>
+                            </p:childTnLst>
+                          </p:cTn>
+                        </p:par>
+                      </p:childTnLst>
+                    </p:cTn>
+                  </p:par>
+                  <p:par>
+                    <p:cTn id="7" fill="hold">
+                      <p:stCondLst>
+                        <p:cond delay="indefinite"/>
+                      </p:stCondLst>
+                      <p:childTnLst>
+                        <p:par>
+                          <p:cTn id="8" fill="hold">
+                            <p:stCondLst>
+                              <p:cond delay="0"/>
+                            </p:stCondLst>
+                            <p:childTnLst>
+                              <p:par>
+                                <p:cTn id="9" presetID="1" presetClass="entr" presetSubtype="0" fill="hold" nodeType="clickEffect">
+                                  <p:stCondLst>
+                                    <p:cond delay="0"/>
+                                  </p:stCondLst>
+                                  <p:childTnLst>
+                                    <p:set>
+                                      <p:cBhvr>
+                                        <p:cTn id="10" dur="1" fill="hold">
+                                          <p:stCondLst>
+                                            <p:cond delay="0"/>
+                                          </p:stCondLst>
+                                        </p:cTn>
+                                        <p:tgtEl>
+                                          <p:spTgt spid="8"/>
+                                        </p:tgtEl>
+                                        <p:attrNameLst>
+                                          <p:attrName>style.visibility</p:attrName>
+                                        </p:attrNameLst>
+                                      </p:cBhvr>
+                                      <p:to>
+                                        <p:strVal val="visible"/>
+                                      </p:to>
+                                    </p:set>
+                                  </p:childTnLst>
+                                </p:cTn>
+                              </p:par>
+                            </p:childTnLst>
+                          </p:cTn>
+                        </p:par>
+                      </p:childTnLst>
+                    </p:cTn>
+                  </p:par>
+                </p:childTnLst>
+              </p:cTn>
+              <p:prevCondLst>
+                <p:cond evt="onPrev" delay="0">
+                  <p:tgtEl>
+                    <p:sldTgt/>
+                  </p:tgtEl>
+                </p:cond>
+              </p:prevCondLst>
+              <p:nextCondLst>
+                <p:cond evt="onNext" delay="0">
+                  <p:tgtEl>
+                    <p:sldTgt/>
+                  </p:tgtEl>
+                </p:cond>
+              </p:nextCondLst>
+            </p:seq>
+          </p:childTnLst>
+        </p:cTn>
+      </p:par>
+    </p:tnLst>
+    <p:bldLst>
+      <p:bldP spid="11" grpId="0" animBg="1"/>
+    </p:bldLst>
+  </p:timing>
+</p:sld>
+</file>
+
+<file path=ppt/slides/slide16.xml><?xml version="1.0" encoding="utf-8"?>
+<p:sld xmlns:a="http://schemas.openxmlformats.org/drawingml/2006/main" xmlns:r="http://schemas.openxmlformats.org/officeDocument/2006/relationships" xmlns:p="http://schemas.openxmlformats.org/presentationml/2006/main">
+  <p:cSld>
+    <p:spTree>
+      <p:nvGrpSpPr>
+        <p:cNvPr id="1" name=""/>
+        <p:cNvGrpSpPr/>
+        <p:nvPr/>
+      </p:nvGrpSpPr>
+      <p:grpSpPr>
+        <a:xfrm>
+          <a:off x="0" y="0"/>
+          <a:ext cx="0" cy="0"/>
+          <a:chOff x="0" y="0"/>
+          <a:chExt cx="0" cy="0"/>
+        </a:xfrm>
+      </p:grpSpPr>
+      <p:sp>
+        <p:nvSpPr>
+          <p:cNvPr id="2" name="Title 1"/>
+          <p:cNvSpPr>
+            <a:spLocks noGrp="1"/>
+          </p:cNvSpPr>
+          <p:nvPr>
+            <p:ph type="title"/>
+          </p:nvPr>
+        </p:nvSpPr>
+        <p:spPr/>
+        <p:txBody>
+          <a:bodyPr/>
+          <a:lstStyle/>
+          <a:p>
+            <a:r>
+              <a:rPr lang="en-US" dirty="0" smtClean="0"/>
+              <a:t>Developing Code</a:t>
+            </a:r>
+            <a:endParaRPr lang="en-US" dirty="0"/>
+          </a:p>
+        </p:txBody>
+      </p:sp>
+      <p:sp>
+        <p:nvSpPr>
+          <p:cNvPr id="4" name="Date Placeholder 3"/>
+          <p:cNvSpPr>
+            <a:spLocks noGrp="1"/>
+          </p:cNvSpPr>
+          <p:nvPr>
+            <p:ph type="dt" sz="half" idx="10"/>
+          </p:nvPr>
+        </p:nvSpPr>
+        <p:spPr/>
+        <p:txBody>
+          <a:bodyPr/>
+          <a:lstStyle/>
+          <a:p>
+            <a:fld id="{7053BEFA-1175-F644-B249-7D41D72BD3FF}" type="datetime1">
+              <a:rPr lang="en-US" smtClean="0"/>
+              <a:t>2/15/17</a:t>
+            </a:fld>
+            <a:endParaRPr lang="en-US"/>
+          </a:p>
+        </p:txBody>
+      </p:sp>
+      <p:sp>
+        <p:nvSpPr>
+          <p:cNvPr id="5" name="Footer Placeholder 4"/>
+          <p:cNvSpPr>
+            <a:spLocks noGrp="1"/>
+          </p:cNvSpPr>
+          <p:nvPr>
+            <p:ph type="ftr" sz="quarter" idx="11"/>
+          </p:nvPr>
+        </p:nvSpPr>
+        <p:spPr/>
+        <p:txBody>
+          <a:bodyPr/>
+          <a:lstStyle/>
+          <a:p>
+            <a:endParaRPr lang="en-US" dirty="0"/>
+          </a:p>
+        </p:txBody>
+      </p:sp>
+      <p:sp>
+        <p:nvSpPr>
+          <p:cNvPr id="6" name="Slide Number Placeholder 5"/>
+          <p:cNvSpPr>
+            <a:spLocks noGrp="1"/>
+          </p:cNvSpPr>
+          <p:nvPr>
+            <p:ph type="sldNum" sz="quarter" idx="12"/>
+          </p:nvPr>
+        </p:nvSpPr>
+        <p:spPr/>
+        <p:txBody>
+          <a:bodyPr/>
+          <a:lstStyle/>
+          <a:p>
+            <a:fld id="{17E276FA-8F89-B34D-A726-BE3FA1F8DD97}" type="slidenum">
+              <a:rPr lang="en-US" smtClean="0"/>
+              <a:t>16</a:t>
+            </a:fld>
+            <a:endParaRPr lang="en-US" dirty="0"/>
+          </a:p>
+        </p:txBody>
+      </p:sp>
+      <p:sp>
+        <p:nvSpPr>
+          <p:cNvPr id="9" name="Content Placeholder 8"/>
+          <p:cNvSpPr>
+            <a:spLocks noGrp="1"/>
+          </p:cNvSpPr>
+          <p:nvPr>
+            <p:ph idx="1"/>
+          </p:nvPr>
+        </p:nvSpPr>
+        <p:spPr/>
+        <p:txBody>
+          <a:bodyPr/>
+          <a:lstStyle/>
+          <a:p>
+            <a:r>
+              <a:rPr lang="en-US" dirty="0" smtClean="0"/>
+              <a:t>Connecting to the DB (</a:t>
+            </a:r>
+            <a:r>
+              <a:rPr lang="en-US" dirty="0" err="1" smtClean="0"/>
+              <a:t>main.py</a:t>
+            </a:r>
+            <a:r>
+              <a:rPr lang="en-US" dirty="0" smtClean="0"/>
+              <a:t>):</a:t>
+            </a:r>
+            <a:endParaRPr lang="en-US" dirty="0"/>
+          </a:p>
+        </p:txBody>
+      </p:sp>
+      <p:pic>
+        <p:nvPicPr>
+          <p:cNvPr id="7" name="Picture 6"/>
+          <p:cNvPicPr>
+            <a:picLocks noChangeAspect="1"/>
+          </p:cNvPicPr>
+          <p:nvPr/>
+        </p:nvPicPr>
+        <p:blipFill>
+          <a:blip r:embed="rId2">
+            <a:extLst>
+              <a:ext uri="{28A0092B-C50C-407E-A947-70E740481C1C}">
+                <a14:useLocalDpi xmlns:a14="http://schemas.microsoft.com/office/drawing/2010/main" val="0"/>
+              </a:ext>
+            </a:extLst>
+          </a:blip>
+          <a:stretch>
+            <a:fillRect/>
+          </a:stretch>
+        </p:blipFill>
+        <p:spPr>
+          <a:xfrm>
+            <a:off x="1968303" y="2310897"/>
+            <a:ext cx="5207395" cy="3839029"/>
+          </a:xfrm>
+          <a:prstGeom prst="rect">
+            <a:avLst/>
+          </a:prstGeom>
+        </p:spPr>
+      </p:pic>
+      <p:sp>
+        <p:nvSpPr>
+          <p:cNvPr id="12" name="Rectangle 11"/>
+          <p:cNvSpPr/>
+          <p:nvPr/>
+        </p:nvSpPr>
+        <p:spPr>
+          <a:xfrm>
+            <a:off x="1896304" y="2232093"/>
+            <a:ext cx="5015135" cy="867368"/>
+          </a:xfrm>
+          <a:prstGeom prst="rect">
+            <a:avLst/>
+          </a:prstGeom>
+          <a:noFill/>
+          <a:ln w="76200"/>
+        </p:spPr>
+        <p:style>
+          <a:lnRef idx="1">
+            <a:schemeClr val="accent1"/>
+          </a:lnRef>
+          <a:fillRef idx="3">
+            <a:schemeClr val="accent1"/>
+          </a:fillRef>
+          <a:effectRef idx="2">
+            <a:schemeClr val="accent1"/>
+          </a:effectRef>
+          <a:fontRef idx="minor">
+            <a:schemeClr val="lt1"/>
+          </a:fontRef>
+        </p:style>
+        <p:txBody>
+          <a:bodyPr rtlCol="0" anchor="ctr"/>
+          <a:lstStyle/>
+          <a:p>
+            <a:pPr algn="ctr"/>
+            <a:endParaRPr lang="en-US" dirty="0">
+              <a:solidFill>
+                <a:schemeClr val="tx1">
+                  <a:lumMod val="85000"/>
+                  <a:lumOff val="15000"/>
+                </a:schemeClr>
+              </a:solidFill>
+            </a:endParaRPr>
+          </a:p>
+        </p:txBody>
+      </p:sp>
+      <p:sp>
+        <p:nvSpPr>
+          <p:cNvPr id="13" name="Rectangle 12"/>
+          <p:cNvSpPr/>
+          <p:nvPr/>
+        </p:nvSpPr>
+        <p:spPr>
+          <a:xfrm>
+            <a:off x="2183278" y="4037141"/>
+            <a:ext cx="4728161" cy="1128625"/>
+          </a:xfrm>
+          <a:prstGeom prst="rect">
+            <a:avLst/>
+          </a:prstGeom>
+          <a:noFill/>
+          <a:ln w="76200"/>
+        </p:spPr>
+        <p:style>
+          <a:lnRef idx="1">
+            <a:schemeClr val="accent1"/>
+          </a:lnRef>
+          <a:fillRef idx="3">
+            <a:schemeClr val="accent1"/>
+          </a:fillRef>
+          <a:effectRef idx="2">
+            <a:schemeClr val="accent1"/>
+          </a:effectRef>
+          <a:fontRef idx="minor">
+            <a:schemeClr val="lt1"/>
+          </a:fontRef>
+        </p:style>
+        <p:txBody>
+          <a:bodyPr rtlCol="0" anchor="ctr"/>
+          <a:lstStyle/>
+          <a:p>
+            <a:pPr algn="ctr"/>
+            <a:endParaRPr lang="en-US" dirty="0">
+              <a:solidFill>
+                <a:schemeClr val="tx1">
+                  <a:lumMod val="85000"/>
+                  <a:lumOff val="15000"/>
+                </a:schemeClr>
+              </a:solidFill>
+            </a:endParaRPr>
+          </a:p>
+        </p:txBody>
+      </p:sp>
+    </p:spTree>
+    <p:extLst>
+      <p:ext uri="{BB962C8B-B14F-4D97-AF65-F5344CB8AC3E}">
+        <p14:creationId xmlns:p14="http://schemas.microsoft.com/office/powerpoint/2010/main" val="1821205809"/>
+      </p:ext>
+    </p:extLst>
+  </p:cSld>
+  <p:clrMapOvr>
+    <a:masterClrMapping/>
+  </p:clrMapOvr>
+  <p:timing>
+    <p:tnLst>
+      <p:par>
+        <p:cTn id="1" dur="indefinite" restart="never" nodeType="tmRoot">
+          <p:childTnLst>
+            <p:seq concurrent="1" nextAc="seek">
+              <p:cTn id="2" dur="indefinite" nodeType="mainSeq">
+                <p:childTnLst>
+                  <p:par>
+                    <p:cTn id="3" fill="hold">
+                      <p:stCondLst>
+                        <p:cond delay="indefinite"/>
+                      </p:stCondLst>
+                      <p:childTnLst>
+                        <p:par>
+                          <p:cTn id="4" fill="hold">
+                            <p:stCondLst>
+                              <p:cond delay="0"/>
+                            </p:stCondLst>
+                            <p:childTnLst>
+                              <p:par>
+                                <p:cTn id="5" presetID="1" presetClass="entr" presetSubtype="0" fill="hold" grpId="0" nodeType="clickEffect">
+                                  <p:stCondLst>
+                                    <p:cond delay="0"/>
+                                  </p:stCondLst>
+                                  <p:childTnLst>
+                                    <p:set>
+                                      <p:cBhvr>
+                                        <p:cTn id="6" dur="1" fill="hold">
+                                          <p:stCondLst>
+                                            <p:cond delay="0"/>
+                                          </p:stCondLst>
+                                        </p:cTn>
+                                        <p:tgtEl>
+                                          <p:spTgt spid="12"/>
+                                        </p:tgtEl>
+                                        <p:attrNameLst>
+                                          <p:attrName>style.visibility</p:attrName>
+                                        </p:attrNameLst>
+                                      </p:cBhvr>
+                                      <p:to>
+                                        <p:strVal val="visible"/>
+                                      </p:to>
+                                    </p:set>
+                                  </p:childTnLst>
+                                </p:cTn>
+                              </p:par>
+                            </p:childTnLst>
+                          </p:cTn>
+                        </p:par>
+                      </p:childTnLst>
+                    </p:cTn>
+                  </p:par>
+                  <p:par>
+                    <p:cTn id="7" fill="hold">
+                      <p:stCondLst>
+                        <p:cond delay="indefinite"/>
+                      </p:stCondLst>
+                      <p:childTnLst>
+                        <p:par>
+                          <p:cTn id="8" fill="hold">
+                            <p:stCondLst>
+                              <p:cond delay="0"/>
+                            </p:stCondLst>
+                            <p:childTnLst>
+                              <p:par>
+                                <p:cTn id="9" presetID="1" presetClass="entr" presetSubtype="0" fill="hold" grpId="0" nodeType="clickEffect">
+                                  <p:stCondLst>
+                                    <p:cond delay="0"/>
+                                  </p:stCondLst>
+                                  <p:childTnLst>
+                                    <p:set>
+                                      <p:cBhvr>
+                                        <p:cTn id="10" dur="1" fill="hold">
+                                          <p:stCondLst>
+                                            <p:cond delay="0"/>
+                                          </p:stCondLst>
+                                        </p:cTn>
+                                        <p:tgtEl>
+                                          <p:spTgt spid="13"/>
+                                        </p:tgtEl>
+                                        <p:attrNameLst>
+                                          <p:attrName>style.visibility</p:attrName>
+                                        </p:attrNameLst>
+                                      </p:cBhvr>
+                                      <p:to>
+                                        <p:strVal val="visible"/>
+                                      </p:to>
+                                    </p:set>
+                                  </p:childTnLst>
+                                </p:cTn>
+                              </p:par>
+                            </p:childTnLst>
+                          </p:cTn>
+                        </p:par>
+                      </p:childTnLst>
+                    </p:cTn>
+                  </p:par>
+                </p:childTnLst>
+              </p:cTn>
+              <p:prevCondLst>
+                <p:cond evt="onPrev" delay="0">
+                  <p:tgtEl>
+                    <p:sldTgt/>
+                  </p:tgtEl>
+                </p:cond>
+              </p:prevCondLst>
+              <p:nextCondLst>
+                <p:cond evt="onNext" delay="0">
+                  <p:tgtEl>
+                    <p:sldTgt/>
+                  </p:tgtEl>
+                </p:cond>
+              </p:nextCondLst>
+            </p:seq>
+          </p:childTnLst>
+        </p:cTn>
+      </p:par>
+    </p:tnLst>
+    <p:bldLst>
+      <p:bldP spid="12" grpId="0" animBg="1"/>
+      <p:bldP spid="13" grpId="0" animBg="1"/>
+    </p:bldLst>
+  </p:timing>
+</p:sld>
+</file>
+
+<file path=ppt/slides/slide17.xml><?xml version="1.0" encoding="utf-8"?>
+<p:sld xmlns:a="http://schemas.openxmlformats.org/drawingml/2006/main" xmlns:r="http://schemas.openxmlformats.org/officeDocument/2006/relationships" xmlns:p="http://schemas.openxmlformats.org/presentationml/2006/main">
+  <p:cSld>
+    <p:spTree>
+      <p:nvGrpSpPr>
+        <p:cNvPr id="1" name=""/>
+        <p:cNvGrpSpPr/>
+        <p:nvPr/>
+      </p:nvGrpSpPr>
+      <p:grpSpPr>
+        <a:xfrm>
+          <a:off x="0" y="0"/>
+          <a:ext cx="0" cy="0"/>
+          <a:chOff x="0" y="0"/>
+          <a:chExt cx="0" cy="0"/>
+        </a:xfrm>
+      </p:grpSpPr>
+      <p:sp>
+        <p:nvSpPr>
+          <p:cNvPr id="2" name="Title 1"/>
+          <p:cNvSpPr>
+            <a:spLocks noGrp="1"/>
+          </p:cNvSpPr>
+          <p:nvPr>
+            <p:ph type="title"/>
+          </p:nvPr>
+        </p:nvSpPr>
+        <p:spPr/>
+        <p:txBody>
+          <a:bodyPr/>
+          <a:lstStyle/>
+          <a:p>
+            <a:r>
+              <a:rPr lang="en-US" dirty="0" smtClean="0"/>
+              <a:t>Developing Code</a:t>
+            </a:r>
+            <a:endParaRPr lang="en-US" dirty="0"/>
+          </a:p>
+        </p:txBody>
+      </p:sp>
+      <p:sp>
+        <p:nvSpPr>
+          <p:cNvPr id="4" name="Date Placeholder 3"/>
+          <p:cNvSpPr>
+            <a:spLocks noGrp="1"/>
+          </p:cNvSpPr>
+          <p:nvPr>
+            <p:ph type="dt" sz="half" idx="10"/>
+          </p:nvPr>
+        </p:nvSpPr>
+        <p:spPr/>
+        <p:txBody>
+          <a:bodyPr/>
+          <a:lstStyle/>
+          <a:p>
+            <a:fld id="{7053BEFA-1175-F644-B249-7D41D72BD3FF}" type="datetime1">
+              <a:rPr lang="en-US" smtClean="0"/>
+              <a:t>2/15/17</a:t>
+            </a:fld>
+            <a:endParaRPr lang="en-US"/>
+          </a:p>
+        </p:txBody>
+      </p:sp>
+      <p:sp>
+        <p:nvSpPr>
+          <p:cNvPr id="5" name="Footer Placeholder 4"/>
+          <p:cNvSpPr>
+            <a:spLocks noGrp="1"/>
+          </p:cNvSpPr>
+          <p:nvPr>
+            <p:ph type="ftr" sz="quarter" idx="11"/>
+          </p:nvPr>
+        </p:nvSpPr>
+        <p:spPr/>
+        <p:txBody>
+          <a:bodyPr/>
+          <a:lstStyle/>
+          <a:p>
+            <a:endParaRPr lang="en-US" dirty="0"/>
+          </a:p>
+        </p:txBody>
+      </p:sp>
+      <p:sp>
+        <p:nvSpPr>
+          <p:cNvPr id="6" name="Slide Number Placeholder 5"/>
+          <p:cNvSpPr>
+            <a:spLocks noGrp="1"/>
+          </p:cNvSpPr>
+          <p:nvPr>
+            <p:ph type="sldNum" sz="quarter" idx="12"/>
+          </p:nvPr>
+        </p:nvSpPr>
+        <p:spPr/>
+        <p:txBody>
+          <a:bodyPr/>
+          <a:lstStyle/>
+          <a:p>
+            <a:fld id="{17E276FA-8F89-B34D-A726-BE3FA1F8DD97}" type="slidenum">
+              <a:rPr lang="en-US" smtClean="0"/>
+              <a:t>17</a:t>
+            </a:fld>
+            <a:endParaRPr lang="en-US" dirty="0"/>
+          </a:p>
+        </p:txBody>
+      </p:sp>
+      <p:sp>
+        <p:nvSpPr>
+          <p:cNvPr id="9" name="Content Placeholder 8"/>
+          <p:cNvSpPr>
+            <a:spLocks noGrp="1"/>
+          </p:cNvSpPr>
+          <p:nvPr>
+            <p:ph idx="1"/>
+          </p:nvPr>
+        </p:nvSpPr>
+        <p:spPr/>
+        <p:txBody>
+          <a:bodyPr/>
+          <a:lstStyle/>
+          <a:p>
+            <a:r>
+              <a:rPr lang="en-US" dirty="0" smtClean="0"/>
+              <a:t>Making a SQL query (</a:t>
+            </a:r>
+            <a:r>
+              <a:rPr lang="en-US" dirty="0" err="1" smtClean="0"/>
+              <a:t>main.py</a:t>
+            </a:r>
+            <a:r>
+              <a:rPr lang="en-US" dirty="0" smtClean="0"/>
+              <a:t>):</a:t>
+            </a:r>
+            <a:endParaRPr lang="en-US" dirty="0"/>
+          </a:p>
+        </p:txBody>
+      </p:sp>
+      <p:pic>
+        <p:nvPicPr>
+          <p:cNvPr id="3" name="Picture 2"/>
+          <p:cNvPicPr>
+            <a:picLocks noChangeAspect="1"/>
+          </p:cNvPicPr>
+          <p:nvPr/>
+        </p:nvPicPr>
+        <p:blipFill>
+          <a:blip r:embed="rId2">
+            <a:extLst>
+              <a:ext uri="{28A0092B-C50C-407E-A947-70E740481C1C}">
+                <a14:useLocalDpi xmlns:a14="http://schemas.microsoft.com/office/drawing/2010/main" val="0"/>
+              </a:ext>
+            </a:extLst>
+          </a:blip>
+          <a:stretch>
+            <a:fillRect/>
+          </a:stretch>
+        </p:blipFill>
+        <p:spPr>
+          <a:xfrm>
+            <a:off x="0" y="2857500"/>
+            <a:ext cx="9144000" cy="1127051"/>
+          </a:xfrm>
+          <a:prstGeom prst="rect">
+            <a:avLst/>
+          </a:prstGeom>
+        </p:spPr>
+      </p:pic>
+      <p:sp>
+        <p:nvSpPr>
+          <p:cNvPr id="12" name="Rectangle 11"/>
+          <p:cNvSpPr/>
+          <p:nvPr/>
+        </p:nvSpPr>
+        <p:spPr>
+          <a:xfrm>
+            <a:off x="817617" y="3051957"/>
+            <a:ext cx="8278883" cy="497359"/>
+          </a:xfrm>
+          <a:prstGeom prst="rect">
+            <a:avLst/>
+          </a:prstGeom>
+          <a:noFill/>
+          <a:ln w="76200"/>
+        </p:spPr>
+        <p:style>
+          <a:lnRef idx="1">
+            <a:schemeClr val="accent1"/>
+          </a:lnRef>
+          <a:fillRef idx="3">
+            <a:schemeClr val="accent1"/>
+          </a:fillRef>
+          <a:effectRef idx="2">
+            <a:schemeClr val="accent1"/>
+          </a:effectRef>
+          <a:fontRef idx="minor">
+            <a:schemeClr val="lt1"/>
+          </a:fontRef>
+        </p:style>
+        <p:txBody>
+          <a:bodyPr rtlCol="0" anchor="ctr"/>
+          <a:lstStyle/>
+          <a:p>
+            <a:pPr algn="ctr"/>
+            <a:endParaRPr lang="en-US" dirty="0">
+              <a:solidFill>
+                <a:schemeClr val="tx1">
+                  <a:lumMod val="85000"/>
+                  <a:lumOff val="15000"/>
+                </a:schemeClr>
+              </a:solidFill>
+            </a:endParaRPr>
+          </a:p>
+        </p:txBody>
+      </p:sp>
+    </p:spTree>
+    <p:extLst>
+      <p:ext uri="{BB962C8B-B14F-4D97-AF65-F5344CB8AC3E}">
+        <p14:creationId xmlns:p14="http://schemas.microsoft.com/office/powerpoint/2010/main" val="1619044138"/>
+      </p:ext>
+    </p:extLst>
+  </p:cSld>
+  <p:clrMapOvr>
+    <a:masterClrMapping/>
+  </p:clrMapOvr>
+  <p:timing>
+    <p:tnLst>
+      <p:par>
+        <p:cTn id="1" dur="indefinite" restart="never" nodeType="tmRoot">
+          <p:childTnLst>
+            <p:seq concurrent="1" nextAc="seek">
+              <p:cTn id="2" dur="indefinite" nodeType="mainSeq">
+                <p:childTnLst>
+                  <p:par>
+                    <p:cTn id="3" fill="hold">
+                      <p:stCondLst>
+                        <p:cond delay="indefinite"/>
+                      </p:stCondLst>
+                      <p:childTnLst>
+                        <p:par>
+                          <p:cTn id="4" fill="hold">
+                            <p:stCondLst>
+                              <p:cond delay="0"/>
+                            </p:stCondLst>
+                            <p:childTnLst>
+                              <p:par>
+                                <p:cTn id="5" presetID="1" presetClass="entr" presetSubtype="0" fill="hold" grpId="0" nodeType="clickEffect">
+                                  <p:stCondLst>
+                                    <p:cond delay="0"/>
+                                  </p:stCondLst>
+                                  <p:childTnLst>
+                                    <p:set>
+                                      <p:cBhvr>
+                                        <p:cTn id="6" dur="1" fill="hold">
+                                          <p:stCondLst>
+                                            <p:cond delay="0"/>
+                                          </p:stCondLst>
+                                        </p:cTn>
+                                        <p:tgtEl>
+                                          <p:spTgt spid="12"/>
+                                        </p:tgtEl>
+                                        <p:attrNameLst>
+                                          <p:attrName>style.visibility</p:attrName>
+                                        </p:attrNameLst>
+                                      </p:cBhvr>
+                                      <p:to>
+                                        <p:strVal val="visible"/>
+                                      </p:to>
+                                    </p:set>
+                                  </p:childTnLst>
+                                </p:cTn>
+                              </p:par>
+                            </p:childTnLst>
+                          </p:cTn>
+                        </p:par>
+                      </p:childTnLst>
+                    </p:cTn>
+                  </p:par>
+                </p:childTnLst>
+              </p:cTn>
+              <p:prevCondLst>
+                <p:cond evt="onPrev" delay="0">
+                  <p:tgtEl>
+                    <p:sldTgt/>
+                  </p:tgtEl>
+                </p:cond>
+              </p:prevCondLst>
+              <p:nextCondLst>
+                <p:cond evt="onNext" delay="0">
+                  <p:tgtEl>
+                    <p:sldTgt/>
+                  </p:tgtEl>
+                </p:cond>
+              </p:nextCondLst>
+            </p:seq>
+          </p:childTnLst>
+        </p:cTn>
+      </p:par>
+    </p:tnLst>
+    <p:bldLst>
+      <p:bldP spid="12" grpId="0" animBg="1"/>
+    </p:bldLst>
+  </p:timing>
+</p:sld>
+</file>
+
+<file path=ppt/slides/slide18.xml><?xml version="1.0" encoding="utf-8"?>
+<p:sld xmlns:a="http://schemas.openxmlformats.org/drawingml/2006/main" xmlns:r="http://schemas.openxmlformats.org/officeDocument/2006/relationships" xmlns:p="http://schemas.openxmlformats.org/presentationml/2006/main">
+  <p:cSld>
+    <p:spTree>
+      <p:nvGrpSpPr>
+        <p:cNvPr id="1" name=""/>
+        <p:cNvGrpSpPr/>
+        <p:nvPr/>
+      </p:nvGrpSpPr>
+      <p:grpSpPr>
+        <a:xfrm>
+          <a:off x="0" y="0"/>
+          <a:ext cx="0" cy="0"/>
+          <a:chOff x="0" y="0"/>
+          <a:chExt cx="0" cy="0"/>
+        </a:xfrm>
+      </p:grpSpPr>
+      <p:sp>
+        <p:nvSpPr>
+          <p:cNvPr id="2" name="Title 1"/>
+          <p:cNvSpPr>
+            <a:spLocks noGrp="1"/>
+          </p:cNvSpPr>
+          <p:nvPr>
+            <p:ph type="title"/>
+          </p:nvPr>
+        </p:nvSpPr>
+        <p:spPr/>
+        <p:txBody>
+          <a:bodyPr/>
+          <a:lstStyle/>
+          <a:p>
+            <a:r>
+              <a:rPr lang="en-US" dirty="0" smtClean="0"/>
+              <a:t>Developing Code</a:t>
+            </a:r>
+            <a:endParaRPr lang="en-US" dirty="0"/>
+          </a:p>
+        </p:txBody>
+      </p:sp>
+      <p:sp>
+        <p:nvSpPr>
+          <p:cNvPr id="4" name="Date Placeholder 3"/>
+          <p:cNvSpPr>
+            <a:spLocks noGrp="1"/>
+          </p:cNvSpPr>
+          <p:nvPr>
+            <p:ph type="dt" sz="half" idx="10"/>
+          </p:nvPr>
+        </p:nvSpPr>
+        <p:spPr/>
+        <p:txBody>
+          <a:bodyPr/>
+          <a:lstStyle/>
+          <a:p>
+            <a:fld id="{7053BEFA-1175-F644-B249-7D41D72BD3FF}" type="datetime1">
+              <a:rPr lang="en-US" smtClean="0"/>
+              <a:t>2/15/17</a:t>
+            </a:fld>
+            <a:endParaRPr lang="en-US"/>
+          </a:p>
+        </p:txBody>
+      </p:sp>
+      <p:sp>
+        <p:nvSpPr>
+          <p:cNvPr id="5" name="Footer Placeholder 4"/>
+          <p:cNvSpPr>
+            <a:spLocks noGrp="1"/>
+          </p:cNvSpPr>
+          <p:nvPr>
+            <p:ph type="ftr" sz="quarter" idx="11"/>
+          </p:nvPr>
+        </p:nvSpPr>
+        <p:spPr/>
+        <p:txBody>
+          <a:bodyPr/>
+          <a:lstStyle/>
+          <a:p>
+            <a:endParaRPr lang="en-US" dirty="0"/>
+          </a:p>
+        </p:txBody>
+      </p:sp>
+      <p:sp>
+        <p:nvSpPr>
+          <p:cNvPr id="6" name="Slide Number Placeholder 5"/>
+          <p:cNvSpPr>
+            <a:spLocks noGrp="1"/>
+          </p:cNvSpPr>
+          <p:nvPr>
+            <p:ph type="sldNum" sz="quarter" idx="12"/>
+          </p:nvPr>
+        </p:nvSpPr>
+        <p:spPr/>
+        <p:txBody>
+          <a:bodyPr/>
+          <a:lstStyle/>
+          <a:p>
+            <a:fld id="{17E276FA-8F89-B34D-A726-BE3FA1F8DD97}" type="slidenum">
+              <a:rPr lang="en-US" smtClean="0"/>
+              <a:t>18</a:t>
+            </a:fld>
+            <a:endParaRPr lang="en-US" dirty="0"/>
+          </a:p>
+        </p:txBody>
+      </p:sp>
+      <p:sp>
+        <p:nvSpPr>
+          <p:cNvPr id="9" name="Content Placeholder 8"/>
+          <p:cNvSpPr>
+            <a:spLocks noGrp="1"/>
+          </p:cNvSpPr>
+          <p:nvPr>
+            <p:ph idx="1"/>
+          </p:nvPr>
+        </p:nvSpPr>
+        <p:spPr/>
+        <p:txBody>
+          <a:bodyPr/>
+          <a:lstStyle/>
+          <a:p>
+            <a:r>
+              <a:rPr lang="en-US" dirty="0" smtClean="0"/>
+              <a:t>Executing and passing data to the view (</a:t>
+            </a:r>
+            <a:r>
+              <a:rPr lang="en-US" dirty="0" err="1" smtClean="0"/>
+              <a:t>main.py</a:t>
+            </a:r>
+            <a:r>
+              <a:rPr lang="en-US" dirty="0" smtClean="0"/>
+              <a:t>):</a:t>
+            </a:r>
+            <a:endParaRPr lang="en-US" dirty="0"/>
+          </a:p>
+        </p:txBody>
+      </p:sp>
+      <p:pic>
+        <p:nvPicPr>
+          <p:cNvPr id="3" name="Picture 2"/>
+          <p:cNvPicPr>
+            <a:picLocks noChangeAspect="1"/>
+          </p:cNvPicPr>
+          <p:nvPr/>
+        </p:nvPicPr>
+        <p:blipFill>
+          <a:blip r:embed="rId2">
+            <a:extLst>
+              <a:ext uri="{28A0092B-C50C-407E-A947-70E740481C1C}">
+                <a14:useLocalDpi xmlns:a14="http://schemas.microsoft.com/office/drawing/2010/main" val="0"/>
+              </a:ext>
+            </a:extLst>
+          </a:blip>
+          <a:stretch>
+            <a:fillRect/>
+          </a:stretch>
+        </p:blipFill>
+        <p:spPr>
+          <a:xfrm>
+            <a:off x="0" y="2857500"/>
+            <a:ext cx="9144000" cy="1127051"/>
+          </a:xfrm>
+          <a:prstGeom prst="rect">
+            <a:avLst/>
+          </a:prstGeom>
+        </p:spPr>
+      </p:pic>
+      <p:sp>
+        <p:nvSpPr>
+          <p:cNvPr id="13" name="Rectangle 12"/>
+          <p:cNvSpPr/>
+          <p:nvPr/>
+        </p:nvSpPr>
+        <p:spPr>
+          <a:xfrm>
+            <a:off x="865117" y="3549316"/>
+            <a:ext cx="4728161" cy="435235"/>
+          </a:xfrm>
+          <a:prstGeom prst="rect">
+            <a:avLst/>
+          </a:prstGeom>
+          <a:noFill/>
+          <a:ln w="76200"/>
+        </p:spPr>
+        <p:style>
+          <a:lnRef idx="1">
+            <a:schemeClr val="accent1"/>
+          </a:lnRef>
+          <a:fillRef idx="3">
+            <a:schemeClr val="accent1"/>
+          </a:fillRef>
+          <a:effectRef idx="2">
+            <a:schemeClr val="accent1"/>
+          </a:effectRef>
+          <a:fontRef idx="minor">
+            <a:schemeClr val="lt1"/>
+          </a:fontRef>
+        </p:style>
+        <p:txBody>
+          <a:bodyPr rtlCol="0" anchor="ctr"/>
+          <a:lstStyle/>
+          <a:p>
+            <a:pPr algn="ctr"/>
+            <a:endParaRPr lang="en-US" dirty="0">
+              <a:solidFill>
+                <a:schemeClr val="tx1">
+                  <a:lumMod val="85000"/>
+                  <a:lumOff val="15000"/>
+                </a:schemeClr>
+              </a:solidFill>
+            </a:endParaRPr>
+          </a:p>
+        </p:txBody>
+      </p:sp>
+    </p:spTree>
+    <p:extLst>
+      <p:ext uri="{BB962C8B-B14F-4D97-AF65-F5344CB8AC3E}">
+        <p14:creationId xmlns:p14="http://schemas.microsoft.com/office/powerpoint/2010/main" val="6959904"/>
+      </p:ext>
+    </p:extLst>
+  </p:cSld>
+  <p:clrMapOvr>
+    <a:masterClrMapping/>
+  </p:clrMapOvr>
+  <p:timing>
+    <p:tnLst>
+      <p:par>
+        <p:cTn id="1" dur="indefinite" restart="never" nodeType="tmRoot">
+          <p:childTnLst>
+            <p:seq concurrent="1" nextAc="seek">
+              <p:cTn id="2" dur="indefinite" nodeType="mainSeq">
+                <p:childTnLst>
+                  <p:par>
+                    <p:cTn id="3" fill="hold">
+                      <p:stCondLst>
+                        <p:cond delay="indefinite"/>
+                      </p:stCondLst>
+                      <p:childTnLst>
+                        <p:par>
+                          <p:cTn id="4" fill="hold">
+                            <p:stCondLst>
+                              <p:cond delay="0"/>
+                            </p:stCondLst>
+                            <p:childTnLst>
+                              <p:par>
+                                <p:cTn id="5" presetID="1" presetClass="entr" presetSubtype="0" fill="hold" grpId="0" nodeType="clickEffect">
+                                  <p:stCondLst>
+                                    <p:cond delay="0"/>
+                                  </p:stCondLst>
+                                  <p:childTnLst>
+                                    <p:set>
+                                      <p:cBhvr>
+                                        <p:cTn id="6" dur="1" fill="hold">
+                                          <p:stCondLst>
+                                            <p:cond delay="0"/>
+                                          </p:stCondLst>
+                                        </p:cTn>
+                                        <p:tgtEl>
+                                          <p:spTgt spid="13"/>
+                                        </p:tgtEl>
+                                        <p:attrNameLst>
+                                          <p:attrName>style.visibility</p:attrName>
+                                        </p:attrNameLst>
+                                      </p:cBhvr>
+                                      <p:to>
+                                        <p:strVal val="visible"/>
+                                      </p:to>
+                                    </p:set>
+                                  </p:childTnLst>
+                                </p:cTn>
+                              </p:par>
+                            </p:childTnLst>
+                          </p:cTn>
+                        </p:par>
+                      </p:childTnLst>
+                    </p:cTn>
+                  </p:par>
+                </p:childTnLst>
+              </p:cTn>
+              <p:prevCondLst>
+                <p:cond evt="onPrev" delay="0">
+                  <p:tgtEl>
+                    <p:sldTgt/>
+                  </p:tgtEl>
+                </p:cond>
+              </p:prevCondLst>
+              <p:nextCondLst>
+                <p:cond evt="onNext" delay="0">
+                  <p:tgtEl>
+                    <p:sldTgt/>
+                  </p:tgtEl>
+                </p:cond>
+              </p:nextCondLst>
+            </p:seq>
+          </p:childTnLst>
+        </p:cTn>
+      </p:par>
+    </p:tnLst>
+    <p:bldLst>
+      <p:bldP spid="13" grpId="0" animBg="1"/>
+    </p:bldLst>
+  </p:timing>
+</p:sld>
+</file>
+
+<file path=ppt/slides/slide19.xml><?xml version="1.0" encoding="utf-8"?>
+<p:sld xmlns:a="http://schemas.openxmlformats.org/drawingml/2006/main" xmlns:r="http://schemas.openxmlformats.org/officeDocument/2006/relationships" xmlns:p="http://schemas.openxmlformats.org/presentationml/2006/main">
+  <p:cSld>
+    <p:spTree>
+      <p:nvGrpSpPr>
+        <p:cNvPr id="1" name=""/>
+        <p:cNvGrpSpPr/>
+        <p:nvPr/>
+      </p:nvGrpSpPr>
+      <p:grpSpPr>
+        <a:xfrm>
+          <a:off x="0" y="0"/>
+          <a:ext cx="0" cy="0"/>
+          <a:chOff x="0" y="0"/>
+          <a:chExt cx="0" cy="0"/>
+        </a:xfrm>
+      </p:grpSpPr>
+      <p:sp>
+        <p:nvSpPr>
+          <p:cNvPr id="2" name="Title 1"/>
+          <p:cNvSpPr>
+            <a:spLocks noGrp="1"/>
+          </p:cNvSpPr>
+          <p:nvPr>
+            <p:ph type="title"/>
+          </p:nvPr>
+        </p:nvSpPr>
+        <p:spPr/>
+        <p:txBody>
+          <a:bodyPr/>
+          <a:lstStyle/>
+          <a:p>
+            <a:r>
+              <a:rPr lang="en-US" dirty="0" smtClean="0"/>
+              <a:t>Developing Code</a:t>
+            </a:r>
+            <a:endParaRPr lang="en-US" dirty="0"/>
+          </a:p>
+        </p:txBody>
+      </p:sp>
+      <p:sp>
+        <p:nvSpPr>
+          <p:cNvPr id="4" name="Date Placeholder 3"/>
+          <p:cNvSpPr>
+            <a:spLocks noGrp="1"/>
+          </p:cNvSpPr>
+          <p:nvPr>
+            <p:ph type="dt" sz="half" idx="10"/>
+          </p:nvPr>
+        </p:nvSpPr>
+        <p:spPr/>
+        <p:txBody>
+          <a:bodyPr/>
+          <a:lstStyle/>
+          <a:p>
+            <a:fld id="{7053BEFA-1175-F644-B249-7D41D72BD3FF}" type="datetime1">
+              <a:rPr lang="en-US" smtClean="0"/>
+              <a:t>2/15/17</a:t>
+            </a:fld>
+            <a:endParaRPr lang="en-US"/>
+          </a:p>
+        </p:txBody>
+      </p:sp>
+      <p:sp>
+        <p:nvSpPr>
+          <p:cNvPr id="5" name="Footer Placeholder 4"/>
+          <p:cNvSpPr>
+            <a:spLocks noGrp="1"/>
+          </p:cNvSpPr>
+          <p:nvPr>
+            <p:ph type="ftr" sz="quarter" idx="11"/>
+          </p:nvPr>
+        </p:nvSpPr>
+        <p:spPr/>
+        <p:txBody>
+          <a:bodyPr/>
+          <a:lstStyle/>
+          <a:p>
+            <a:endParaRPr lang="en-US" dirty="0"/>
+          </a:p>
+        </p:txBody>
+      </p:sp>
+      <p:sp>
+        <p:nvSpPr>
+          <p:cNvPr id="6" name="Slide Number Placeholder 5"/>
+          <p:cNvSpPr>
+            <a:spLocks noGrp="1"/>
+          </p:cNvSpPr>
+          <p:nvPr>
+            <p:ph type="sldNum" sz="quarter" idx="12"/>
+          </p:nvPr>
+        </p:nvSpPr>
+        <p:spPr/>
+        <p:txBody>
+          <a:bodyPr/>
+          <a:lstStyle/>
+          <a:p>
+            <a:fld id="{17E276FA-8F89-B34D-A726-BE3FA1F8DD97}" type="slidenum">
+              <a:rPr lang="en-US" smtClean="0"/>
+              <a:t>19</a:t>
+            </a:fld>
+            <a:endParaRPr lang="en-US" dirty="0"/>
+          </a:p>
+        </p:txBody>
+      </p:sp>
+      <p:sp>
+        <p:nvSpPr>
+          <p:cNvPr id="9" name="Content Placeholder 8"/>
+          <p:cNvSpPr>
+            <a:spLocks noGrp="1"/>
+          </p:cNvSpPr>
+          <p:nvPr>
+            <p:ph idx="1"/>
+          </p:nvPr>
+        </p:nvSpPr>
+        <p:spPr/>
+        <p:txBody>
+          <a:bodyPr/>
+          <a:lstStyle/>
+          <a:p>
+            <a:r>
+              <a:rPr lang="en-US" dirty="0" smtClean="0"/>
+              <a:t>“Installing” Vega-lite (</a:t>
+            </a:r>
+            <a:r>
+              <a:rPr lang="en-US" dirty="0" err="1" smtClean="0"/>
+              <a:t>index.html</a:t>
+            </a:r>
+            <a:r>
+              <a:rPr lang="en-US" dirty="0" smtClean="0"/>
+              <a:t>):</a:t>
+            </a:r>
+            <a:endParaRPr lang="en-US" dirty="0"/>
+          </a:p>
+        </p:txBody>
+      </p:sp>
+      <p:pic>
+        <p:nvPicPr>
+          <p:cNvPr id="7" name="Picture 6"/>
+          <p:cNvPicPr>
+            <a:picLocks noChangeAspect="1"/>
+          </p:cNvPicPr>
+          <p:nvPr/>
+        </p:nvPicPr>
+        <p:blipFill>
+          <a:blip r:embed="rId2">
+            <a:extLst>
+              <a:ext uri="{28A0092B-C50C-407E-A947-70E740481C1C}">
+                <a14:useLocalDpi xmlns:a14="http://schemas.microsoft.com/office/drawing/2010/main" val="0"/>
+              </a:ext>
+            </a:extLst>
+          </a:blip>
+          <a:stretch>
+            <a:fillRect/>
+          </a:stretch>
+        </p:blipFill>
+        <p:spPr>
+          <a:xfrm>
+            <a:off x="166749" y="2658343"/>
+            <a:ext cx="8750300" cy="2349500"/>
+          </a:xfrm>
+          <a:prstGeom prst="rect">
+            <a:avLst/>
+          </a:prstGeom>
+        </p:spPr>
+      </p:pic>
+    </p:spTree>
+    <p:extLst>
+      <p:ext uri="{BB962C8B-B14F-4D97-AF65-F5344CB8AC3E}">
+        <p14:creationId xmlns:p14="http://schemas.microsoft.com/office/powerpoint/2010/main" val="1083118812"/>
       </p:ext>
     </p:extLst>
   </p:cSld>
@@ -9721,6 +11938,1195 @@
     <p:extLst>
       <p:ext uri="{BB962C8B-B14F-4D97-AF65-F5344CB8AC3E}">
         <p14:creationId xmlns:p14="http://schemas.microsoft.com/office/powerpoint/2010/main" val="1156379376"/>
+      </p:ext>
+    </p:extLst>
+  </p:cSld>
+  <p:clrMapOvr>
+    <a:masterClrMapping/>
+  </p:clrMapOvr>
+  <p:timing>
+    <p:tnLst>
+      <p:par>
+        <p:cTn id="1" dur="indefinite" restart="never" nodeType="tmRoot"/>
+      </p:par>
+    </p:tnLst>
+  </p:timing>
+</p:sld>
+</file>
+
+<file path=ppt/slides/slide20.xml><?xml version="1.0" encoding="utf-8"?>
+<p:sld xmlns:a="http://schemas.openxmlformats.org/drawingml/2006/main" xmlns:r="http://schemas.openxmlformats.org/officeDocument/2006/relationships" xmlns:p="http://schemas.openxmlformats.org/presentationml/2006/main">
+  <p:cSld>
+    <p:spTree>
+      <p:nvGrpSpPr>
+        <p:cNvPr id="1" name=""/>
+        <p:cNvGrpSpPr/>
+        <p:nvPr/>
+      </p:nvGrpSpPr>
+      <p:grpSpPr>
+        <a:xfrm>
+          <a:off x="0" y="0"/>
+          <a:ext cx="0" cy="0"/>
+          <a:chOff x="0" y="0"/>
+          <a:chExt cx="0" cy="0"/>
+        </a:xfrm>
+      </p:grpSpPr>
+      <p:sp>
+        <p:nvSpPr>
+          <p:cNvPr id="2" name="Title 1"/>
+          <p:cNvSpPr>
+            <a:spLocks noGrp="1"/>
+          </p:cNvSpPr>
+          <p:nvPr>
+            <p:ph type="title"/>
+          </p:nvPr>
+        </p:nvSpPr>
+        <p:spPr/>
+        <p:txBody>
+          <a:bodyPr/>
+          <a:lstStyle/>
+          <a:p>
+            <a:r>
+              <a:rPr lang="en-US" dirty="0" smtClean="0"/>
+              <a:t>Developing Code</a:t>
+            </a:r>
+            <a:endParaRPr lang="en-US" dirty="0"/>
+          </a:p>
+        </p:txBody>
+      </p:sp>
+      <p:sp>
+        <p:nvSpPr>
+          <p:cNvPr id="4" name="Date Placeholder 3"/>
+          <p:cNvSpPr>
+            <a:spLocks noGrp="1"/>
+          </p:cNvSpPr>
+          <p:nvPr>
+            <p:ph type="dt" sz="half" idx="10"/>
+          </p:nvPr>
+        </p:nvSpPr>
+        <p:spPr/>
+        <p:txBody>
+          <a:bodyPr/>
+          <a:lstStyle/>
+          <a:p>
+            <a:fld id="{7053BEFA-1175-F644-B249-7D41D72BD3FF}" type="datetime1">
+              <a:rPr lang="en-US" smtClean="0"/>
+              <a:t>2/15/17</a:t>
+            </a:fld>
+            <a:endParaRPr lang="en-US"/>
+          </a:p>
+        </p:txBody>
+      </p:sp>
+      <p:sp>
+        <p:nvSpPr>
+          <p:cNvPr id="5" name="Footer Placeholder 4"/>
+          <p:cNvSpPr>
+            <a:spLocks noGrp="1"/>
+          </p:cNvSpPr>
+          <p:nvPr>
+            <p:ph type="ftr" sz="quarter" idx="11"/>
+          </p:nvPr>
+        </p:nvSpPr>
+        <p:spPr/>
+        <p:txBody>
+          <a:bodyPr/>
+          <a:lstStyle/>
+          <a:p>
+            <a:endParaRPr lang="en-US" dirty="0"/>
+          </a:p>
+        </p:txBody>
+      </p:sp>
+      <p:sp>
+        <p:nvSpPr>
+          <p:cNvPr id="6" name="Slide Number Placeholder 5"/>
+          <p:cNvSpPr>
+            <a:spLocks noGrp="1"/>
+          </p:cNvSpPr>
+          <p:nvPr>
+            <p:ph type="sldNum" sz="quarter" idx="12"/>
+          </p:nvPr>
+        </p:nvSpPr>
+        <p:spPr/>
+        <p:txBody>
+          <a:bodyPr/>
+          <a:lstStyle/>
+          <a:p>
+            <a:fld id="{17E276FA-8F89-B34D-A726-BE3FA1F8DD97}" type="slidenum">
+              <a:rPr lang="en-US" smtClean="0"/>
+              <a:t>20</a:t>
+            </a:fld>
+            <a:endParaRPr lang="en-US" dirty="0"/>
+          </a:p>
+        </p:txBody>
+      </p:sp>
+      <p:sp>
+        <p:nvSpPr>
+          <p:cNvPr id="9" name="Content Placeholder 8"/>
+          <p:cNvSpPr>
+            <a:spLocks noGrp="1"/>
+          </p:cNvSpPr>
+          <p:nvPr>
+            <p:ph idx="1"/>
+          </p:nvPr>
+        </p:nvSpPr>
+        <p:spPr/>
+        <p:txBody>
+          <a:bodyPr/>
+          <a:lstStyle/>
+          <a:p>
+            <a:r>
+              <a:rPr lang="en-US" dirty="0" smtClean="0"/>
+              <a:t>Displaying visualization (</a:t>
+            </a:r>
+            <a:r>
+              <a:rPr lang="en-US" dirty="0" err="1" smtClean="0"/>
+              <a:t>index.html</a:t>
+            </a:r>
+            <a:r>
+              <a:rPr lang="en-US" dirty="0" smtClean="0"/>
+              <a:t>):</a:t>
+            </a:r>
+            <a:endParaRPr lang="en-US" dirty="0"/>
+          </a:p>
+        </p:txBody>
+      </p:sp>
+      <p:pic>
+        <p:nvPicPr>
+          <p:cNvPr id="3" name="Picture 2"/>
+          <p:cNvPicPr>
+            <a:picLocks noChangeAspect="1"/>
+          </p:cNvPicPr>
+          <p:nvPr/>
+        </p:nvPicPr>
+        <p:blipFill>
+          <a:blip r:embed="rId2">
+            <a:extLst>
+              <a:ext uri="{28A0092B-C50C-407E-A947-70E740481C1C}">
+                <a14:useLocalDpi xmlns:a14="http://schemas.microsoft.com/office/drawing/2010/main" val="0"/>
+              </a:ext>
+            </a:extLst>
+          </a:blip>
+          <a:stretch>
+            <a:fillRect/>
+          </a:stretch>
+        </p:blipFill>
+        <p:spPr>
+          <a:xfrm>
+            <a:off x="1689598" y="2413098"/>
+            <a:ext cx="5328719" cy="3967787"/>
+          </a:xfrm>
+          <a:prstGeom prst="rect">
+            <a:avLst/>
+          </a:prstGeom>
+        </p:spPr>
+      </p:pic>
+      <p:sp>
+        <p:nvSpPr>
+          <p:cNvPr id="13" name="Rectangle 12"/>
+          <p:cNvSpPr/>
+          <p:nvPr/>
+        </p:nvSpPr>
+        <p:spPr>
+          <a:xfrm>
+            <a:off x="1888177" y="2516163"/>
+            <a:ext cx="6008914" cy="435235"/>
+          </a:xfrm>
+          <a:prstGeom prst="rect">
+            <a:avLst/>
+          </a:prstGeom>
+          <a:noFill/>
+          <a:ln w="76200"/>
+        </p:spPr>
+        <p:style>
+          <a:lnRef idx="1">
+            <a:schemeClr val="accent1"/>
+          </a:lnRef>
+          <a:fillRef idx="3">
+            <a:schemeClr val="accent1"/>
+          </a:fillRef>
+          <a:effectRef idx="2">
+            <a:schemeClr val="accent1"/>
+          </a:effectRef>
+          <a:fontRef idx="minor">
+            <a:schemeClr val="lt1"/>
+          </a:fontRef>
+        </p:style>
+        <p:txBody>
+          <a:bodyPr rtlCol="0" anchor="ctr"/>
+          <a:lstStyle/>
+          <a:p>
+            <a:pPr algn="r"/>
+            <a:r>
+              <a:rPr lang="en-US" dirty="0" smtClean="0">
+                <a:solidFill>
+                  <a:schemeClr val="tx1">
+                    <a:lumMod val="85000"/>
+                    <a:lumOff val="15000"/>
+                  </a:schemeClr>
+                </a:solidFill>
+              </a:rPr>
+              <a:t>&lt;- Element to display in</a:t>
+            </a:r>
+            <a:endParaRPr lang="en-US" dirty="0">
+              <a:solidFill>
+                <a:schemeClr val="tx1">
+                  <a:lumMod val="85000"/>
+                  <a:lumOff val="15000"/>
+                </a:schemeClr>
+              </a:solidFill>
+            </a:endParaRPr>
+          </a:p>
+        </p:txBody>
+      </p:sp>
+      <p:sp>
+        <p:nvSpPr>
+          <p:cNvPr id="10" name="Rectangle 9"/>
+          <p:cNvSpPr/>
+          <p:nvPr/>
+        </p:nvSpPr>
+        <p:spPr>
+          <a:xfrm>
+            <a:off x="1888177" y="2951398"/>
+            <a:ext cx="6008914" cy="2226244"/>
+          </a:xfrm>
+          <a:prstGeom prst="rect">
+            <a:avLst/>
+          </a:prstGeom>
+          <a:noFill/>
+          <a:ln w="76200"/>
+        </p:spPr>
+        <p:style>
+          <a:lnRef idx="1">
+            <a:schemeClr val="accent1"/>
+          </a:lnRef>
+          <a:fillRef idx="3">
+            <a:schemeClr val="accent1"/>
+          </a:fillRef>
+          <a:effectRef idx="2">
+            <a:schemeClr val="accent1"/>
+          </a:effectRef>
+          <a:fontRef idx="minor">
+            <a:schemeClr val="lt1"/>
+          </a:fontRef>
+        </p:style>
+        <p:txBody>
+          <a:bodyPr rtlCol="0" anchor="ctr"/>
+          <a:lstStyle/>
+          <a:p>
+            <a:pPr algn="r"/>
+            <a:r>
+              <a:rPr lang="en-US" dirty="0" smtClean="0">
+                <a:solidFill>
+                  <a:schemeClr val="tx1">
+                    <a:lumMod val="85000"/>
+                    <a:lumOff val="15000"/>
+                  </a:schemeClr>
+                </a:solidFill>
+              </a:rPr>
+              <a:t>&lt;- Data and visualization specification</a:t>
+            </a:r>
+            <a:endParaRPr lang="en-US" dirty="0">
+              <a:solidFill>
+                <a:schemeClr val="tx1">
+                  <a:lumMod val="85000"/>
+                  <a:lumOff val="15000"/>
+                </a:schemeClr>
+              </a:solidFill>
+            </a:endParaRPr>
+          </a:p>
+        </p:txBody>
+      </p:sp>
+      <p:sp>
+        <p:nvSpPr>
+          <p:cNvPr id="11" name="Rectangle 10"/>
+          <p:cNvSpPr/>
+          <p:nvPr/>
+        </p:nvSpPr>
+        <p:spPr>
+          <a:xfrm>
+            <a:off x="1888177" y="5743587"/>
+            <a:ext cx="6008914" cy="586607"/>
+          </a:xfrm>
+          <a:prstGeom prst="rect">
+            <a:avLst/>
+          </a:prstGeom>
+          <a:noFill/>
+          <a:ln w="76200"/>
+        </p:spPr>
+        <p:style>
+          <a:lnRef idx="1">
+            <a:schemeClr val="accent1"/>
+          </a:lnRef>
+          <a:fillRef idx="3">
+            <a:schemeClr val="accent1"/>
+          </a:fillRef>
+          <a:effectRef idx="2">
+            <a:schemeClr val="accent1"/>
+          </a:effectRef>
+          <a:fontRef idx="minor">
+            <a:schemeClr val="lt1"/>
+          </a:fontRef>
+        </p:style>
+        <p:txBody>
+          <a:bodyPr rtlCol="0" anchor="ctr"/>
+          <a:lstStyle/>
+          <a:p>
+            <a:pPr algn="r"/>
+            <a:r>
+              <a:rPr lang="en-US" dirty="0" smtClean="0">
+                <a:solidFill>
+                  <a:schemeClr val="tx1">
+                    <a:lumMod val="85000"/>
+                    <a:lumOff val="15000"/>
+                  </a:schemeClr>
+                </a:solidFill>
+              </a:rPr>
+              <a:t>&lt;- Instruct Vega-lite to display in element</a:t>
+            </a:r>
+            <a:endParaRPr lang="en-US" dirty="0">
+              <a:solidFill>
+                <a:schemeClr val="tx1">
+                  <a:lumMod val="85000"/>
+                  <a:lumOff val="15000"/>
+                </a:schemeClr>
+              </a:solidFill>
+            </a:endParaRPr>
+          </a:p>
+        </p:txBody>
+      </p:sp>
+    </p:spTree>
+    <p:extLst>
+      <p:ext uri="{BB962C8B-B14F-4D97-AF65-F5344CB8AC3E}">
+        <p14:creationId xmlns:p14="http://schemas.microsoft.com/office/powerpoint/2010/main" val="478969147"/>
+      </p:ext>
+    </p:extLst>
+  </p:cSld>
+  <p:clrMapOvr>
+    <a:masterClrMapping/>
+  </p:clrMapOvr>
+  <p:timing>
+    <p:tnLst>
+      <p:par>
+        <p:cTn id="1" dur="indefinite" restart="never" nodeType="tmRoot">
+          <p:childTnLst>
+            <p:seq concurrent="1" nextAc="seek">
+              <p:cTn id="2" dur="indefinite" nodeType="mainSeq">
+                <p:childTnLst>
+                  <p:par>
+                    <p:cTn id="3" fill="hold">
+                      <p:stCondLst>
+                        <p:cond delay="indefinite"/>
+                      </p:stCondLst>
+                      <p:childTnLst>
+                        <p:par>
+                          <p:cTn id="4" fill="hold">
+                            <p:stCondLst>
+                              <p:cond delay="0"/>
+                            </p:stCondLst>
+                            <p:childTnLst>
+                              <p:par>
+                                <p:cTn id="5" presetID="1" presetClass="entr" presetSubtype="0" fill="hold" grpId="0" nodeType="clickEffect">
+                                  <p:stCondLst>
+                                    <p:cond delay="0"/>
+                                  </p:stCondLst>
+                                  <p:childTnLst>
+                                    <p:set>
+                                      <p:cBhvr>
+                                        <p:cTn id="6" dur="1" fill="hold">
+                                          <p:stCondLst>
+                                            <p:cond delay="0"/>
+                                          </p:stCondLst>
+                                        </p:cTn>
+                                        <p:tgtEl>
+                                          <p:spTgt spid="13"/>
+                                        </p:tgtEl>
+                                        <p:attrNameLst>
+                                          <p:attrName>style.visibility</p:attrName>
+                                        </p:attrNameLst>
+                                      </p:cBhvr>
+                                      <p:to>
+                                        <p:strVal val="visible"/>
+                                      </p:to>
+                                    </p:set>
+                                  </p:childTnLst>
+                                </p:cTn>
+                              </p:par>
+                            </p:childTnLst>
+                          </p:cTn>
+                        </p:par>
+                      </p:childTnLst>
+                    </p:cTn>
+                  </p:par>
+                  <p:par>
+                    <p:cTn id="7" fill="hold">
+                      <p:stCondLst>
+                        <p:cond delay="indefinite"/>
+                      </p:stCondLst>
+                      <p:childTnLst>
+                        <p:par>
+                          <p:cTn id="8" fill="hold">
+                            <p:stCondLst>
+                              <p:cond delay="0"/>
+                            </p:stCondLst>
+                            <p:childTnLst>
+                              <p:par>
+                                <p:cTn id="9" presetID="1" presetClass="entr" presetSubtype="0" fill="hold" grpId="0" nodeType="clickEffect">
+                                  <p:stCondLst>
+                                    <p:cond delay="0"/>
+                                  </p:stCondLst>
+                                  <p:childTnLst>
+                                    <p:set>
+                                      <p:cBhvr>
+                                        <p:cTn id="10" dur="1" fill="hold">
+                                          <p:stCondLst>
+                                            <p:cond delay="0"/>
+                                          </p:stCondLst>
+                                        </p:cTn>
+                                        <p:tgtEl>
+                                          <p:spTgt spid="10"/>
+                                        </p:tgtEl>
+                                        <p:attrNameLst>
+                                          <p:attrName>style.visibility</p:attrName>
+                                        </p:attrNameLst>
+                                      </p:cBhvr>
+                                      <p:to>
+                                        <p:strVal val="visible"/>
+                                      </p:to>
+                                    </p:set>
+                                  </p:childTnLst>
+                                </p:cTn>
+                              </p:par>
+                            </p:childTnLst>
+                          </p:cTn>
+                        </p:par>
+                      </p:childTnLst>
+                    </p:cTn>
+                  </p:par>
+                  <p:par>
+                    <p:cTn id="11" fill="hold">
+                      <p:stCondLst>
+                        <p:cond delay="indefinite"/>
+                      </p:stCondLst>
+                      <p:childTnLst>
+                        <p:par>
+                          <p:cTn id="12" fill="hold">
+                            <p:stCondLst>
+                              <p:cond delay="0"/>
+                            </p:stCondLst>
+                            <p:childTnLst>
+                              <p:par>
+                                <p:cTn id="13" presetID="1" presetClass="entr" presetSubtype="0" fill="hold" grpId="0" nodeType="clickEffect">
+                                  <p:stCondLst>
+                                    <p:cond delay="0"/>
+                                  </p:stCondLst>
+                                  <p:childTnLst>
+                                    <p:set>
+                                      <p:cBhvr>
+                                        <p:cTn id="14" dur="1" fill="hold">
+                                          <p:stCondLst>
+                                            <p:cond delay="0"/>
+                                          </p:stCondLst>
+                                        </p:cTn>
+                                        <p:tgtEl>
+                                          <p:spTgt spid="11"/>
+                                        </p:tgtEl>
+                                        <p:attrNameLst>
+                                          <p:attrName>style.visibility</p:attrName>
+                                        </p:attrNameLst>
+                                      </p:cBhvr>
+                                      <p:to>
+                                        <p:strVal val="visible"/>
+                                      </p:to>
+                                    </p:set>
+                                  </p:childTnLst>
+                                </p:cTn>
+                              </p:par>
+                            </p:childTnLst>
+                          </p:cTn>
+                        </p:par>
+                      </p:childTnLst>
+                    </p:cTn>
+                  </p:par>
+                </p:childTnLst>
+              </p:cTn>
+              <p:prevCondLst>
+                <p:cond evt="onPrev" delay="0">
+                  <p:tgtEl>
+                    <p:sldTgt/>
+                  </p:tgtEl>
+                </p:cond>
+              </p:prevCondLst>
+              <p:nextCondLst>
+                <p:cond evt="onNext" delay="0">
+                  <p:tgtEl>
+                    <p:sldTgt/>
+                  </p:tgtEl>
+                </p:cond>
+              </p:nextCondLst>
+            </p:seq>
+          </p:childTnLst>
+        </p:cTn>
+      </p:par>
+    </p:tnLst>
+    <p:bldLst>
+      <p:bldP spid="13" grpId="0" animBg="1"/>
+      <p:bldP spid="10" grpId="0" animBg="1"/>
+      <p:bldP spid="11" grpId="0" animBg="1"/>
+    </p:bldLst>
+  </p:timing>
+</p:sld>
+</file>
+
+<file path=ppt/slides/slide21.xml><?xml version="1.0" encoding="utf-8"?>
+<p:sld xmlns:a="http://schemas.openxmlformats.org/drawingml/2006/main" xmlns:r="http://schemas.openxmlformats.org/officeDocument/2006/relationships" xmlns:p="http://schemas.openxmlformats.org/presentationml/2006/main">
+  <p:cSld>
+    <p:spTree>
+      <p:nvGrpSpPr>
+        <p:cNvPr id="1" name=""/>
+        <p:cNvGrpSpPr/>
+        <p:nvPr/>
+      </p:nvGrpSpPr>
+      <p:grpSpPr>
+        <a:xfrm>
+          <a:off x="0" y="0"/>
+          <a:ext cx="0" cy="0"/>
+          <a:chOff x="0" y="0"/>
+          <a:chExt cx="0" cy="0"/>
+        </a:xfrm>
+      </p:grpSpPr>
+      <p:sp>
+        <p:nvSpPr>
+          <p:cNvPr id="2" name="Title 1"/>
+          <p:cNvSpPr>
+            <a:spLocks noGrp="1"/>
+          </p:cNvSpPr>
+          <p:nvPr>
+            <p:ph type="title"/>
+          </p:nvPr>
+        </p:nvSpPr>
+        <p:spPr/>
+        <p:txBody>
+          <a:bodyPr/>
+          <a:lstStyle/>
+          <a:p>
+            <a:r>
+              <a:rPr lang="en-US" dirty="0" smtClean="0"/>
+              <a:t>Developing Code</a:t>
+            </a:r>
+            <a:endParaRPr lang="en-US" dirty="0"/>
+          </a:p>
+        </p:txBody>
+      </p:sp>
+      <p:sp>
+        <p:nvSpPr>
+          <p:cNvPr id="4" name="Date Placeholder 3"/>
+          <p:cNvSpPr>
+            <a:spLocks noGrp="1"/>
+          </p:cNvSpPr>
+          <p:nvPr>
+            <p:ph type="dt" sz="half" idx="10"/>
+          </p:nvPr>
+        </p:nvSpPr>
+        <p:spPr/>
+        <p:txBody>
+          <a:bodyPr/>
+          <a:lstStyle/>
+          <a:p>
+            <a:fld id="{7053BEFA-1175-F644-B249-7D41D72BD3FF}" type="datetime1">
+              <a:rPr lang="en-US" smtClean="0"/>
+              <a:t>2/15/17</a:t>
+            </a:fld>
+            <a:endParaRPr lang="en-US"/>
+          </a:p>
+        </p:txBody>
+      </p:sp>
+      <p:sp>
+        <p:nvSpPr>
+          <p:cNvPr id="5" name="Footer Placeholder 4"/>
+          <p:cNvSpPr>
+            <a:spLocks noGrp="1"/>
+          </p:cNvSpPr>
+          <p:nvPr>
+            <p:ph type="ftr" sz="quarter" idx="11"/>
+          </p:nvPr>
+        </p:nvSpPr>
+        <p:spPr/>
+        <p:txBody>
+          <a:bodyPr/>
+          <a:lstStyle/>
+          <a:p>
+            <a:endParaRPr lang="en-US" dirty="0"/>
+          </a:p>
+        </p:txBody>
+      </p:sp>
+      <p:sp>
+        <p:nvSpPr>
+          <p:cNvPr id="6" name="Slide Number Placeholder 5"/>
+          <p:cNvSpPr>
+            <a:spLocks noGrp="1"/>
+          </p:cNvSpPr>
+          <p:nvPr>
+            <p:ph type="sldNum" sz="quarter" idx="12"/>
+          </p:nvPr>
+        </p:nvSpPr>
+        <p:spPr/>
+        <p:txBody>
+          <a:bodyPr/>
+          <a:lstStyle/>
+          <a:p>
+            <a:fld id="{17E276FA-8F89-B34D-A726-BE3FA1F8DD97}" type="slidenum">
+              <a:rPr lang="en-US" smtClean="0"/>
+              <a:t>21</a:t>
+            </a:fld>
+            <a:endParaRPr lang="en-US" dirty="0"/>
+          </a:p>
+        </p:txBody>
+      </p:sp>
+      <p:sp>
+        <p:nvSpPr>
+          <p:cNvPr id="9" name="Content Placeholder 8"/>
+          <p:cNvSpPr>
+            <a:spLocks noGrp="1"/>
+          </p:cNvSpPr>
+          <p:nvPr>
+            <p:ph idx="1"/>
+          </p:nvPr>
+        </p:nvSpPr>
+        <p:spPr/>
+        <p:txBody>
+          <a:bodyPr/>
+          <a:lstStyle/>
+          <a:p>
+            <a:r>
+              <a:rPr lang="en-US" dirty="0" smtClean="0"/>
+              <a:t>If you do not like Vega-lite examples or if you don’t like changing JSON to get your chart just right, </a:t>
+            </a:r>
+            <a:r>
+              <a:rPr lang="en-US" b="1" dirty="0" smtClean="0"/>
+              <a:t>use Lyra </a:t>
+            </a:r>
+            <a:r>
+              <a:rPr lang="en-US" b="1" dirty="0"/>
+              <a:t>(optional): </a:t>
+            </a:r>
+            <a:r>
+              <a:rPr lang="en-US" sz="2400" dirty="0"/>
+              <a:t>http://</a:t>
+            </a:r>
+            <a:r>
+              <a:rPr lang="en-US" sz="2400" dirty="0" err="1"/>
+              <a:t>idl.cs.washington.edu</a:t>
+            </a:r>
+            <a:r>
+              <a:rPr lang="en-US" sz="2400" dirty="0"/>
+              <a:t>/projects/</a:t>
+            </a:r>
+            <a:r>
+              <a:rPr lang="en-US" sz="2400" dirty="0" err="1"/>
+              <a:t>lyra</a:t>
+            </a:r>
+            <a:r>
+              <a:rPr lang="en-US" sz="2400" dirty="0"/>
+              <a:t>/app/</a:t>
+            </a:r>
+            <a:endParaRPr lang="en-US" dirty="0"/>
+          </a:p>
+        </p:txBody>
+      </p:sp>
+    </p:spTree>
+    <p:extLst>
+      <p:ext uri="{BB962C8B-B14F-4D97-AF65-F5344CB8AC3E}">
+        <p14:creationId xmlns:p14="http://schemas.microsoft.com/office/powerpoint/2010/main" val="477134663"/>
+      </p:ext>
+    </p:extLst>
+  </p:cSld>
+  <p:clrMapOvr>
+    <a:masterClrMapping/>
+  </p:clrMapOvr>
+  <p:timing>
+    <p:tnLst>
+      <p:par>
+        <p:cTn id="1" dur="indefinite" restart="never" nodeType="tmRoot"/>
+      </p:par>
+    </p:tnLst>
+  </p:timing>
+</p:sld>
+</file>
+
+<file path=ppt/slides/slide22.xml><?xml version="1.0" encoding="utf-8"?>
+<p:sld xmlns:a="http://schemas.openxmlformats.org/drawingml/2006/main" xmlns:r="http://schemas.openxmlformats.org/officeDocument/2006/relationships" xmlns:p="http://schemas.openxmlformats.org/presentationml/2006/main">
+  <p:cSld>
+    <p:spTree>
+      <p:nvGrpSpPr>
+        <p:cNvPr id="1" name=""/>
+        <p:cNvGrpSpPr/>
+        <p:nvPr/>
+      </p:nvGrpSpPr>
+      <p:grpSpPr>
+        <a:xfrm>
+          <a:off x="0" y="0"/>
+          <a:ext cx="0" cy="0"/>
+          <a:chOff x="0" y="0"/>
+          <a:chExt cx="0" cy="0"/>
+        </a:xfrm>
+      </p:grpSpPr>
+      <p:sp>
+        <p:nvSpPr>
+          <p:cNvPr id="2" name="Title 1"/>
+          <p:cNvSpPr>
+            <a:spLocks noGrp="1"/>
+          </p:cNvSpPr>
+          <p:nvPr>
+            <p:ph type="title"/>
+          </p:nvPr>
+        </p:nvSpPr>
+        <p:spPr/>
+        <p:txBody>
+          <a:bodyPr/>
+          <a:lstStyle/>
+          <a:p>
+            <a:r>
+              <a:rPr lang="en-US" dirty="0" smtClean="0"/>
+              <a:t>Developing Code</a:t>
+            </a:r>
+            <a:endParaRPr lang="en-US" dirty="0"/>
+          </a:p>
+        </p:txBody>
+      </p:sp>
+      <p:sp>
+        <p:nvSpPr>
+          <p:cNvPr id="4" name="Date Placeholder 3"/>
+          <p:cNvSpPr>
+            <a:spLocks noGrp="1"/>
+          </p:cNvSpPr>
+          <p:nvPr>
+            <p:ph type="dt" sz="half" idx="10"/>
+          </p:nvPr>
+        </p:nvSpPr>
+        <p:spPr/>
+        <p:txBody>
+          <a:bodyPr/>
+          <a:lstStyle/>
+          <a:p>
+            <a:fld id="{7053BEFA-1175-F644-B249-7D41D72BD3FF}" type="datetime1">
+              <a:rPr lang="en-US" smtClean="0"/>
+              <a:t>2/15/17</a:t>
+            </a:fld>
+            <a:endParaRPr lang="en-US"/>
+          </a:p>
+        </p:txBody>
+      </p:sp>
+      <p:sp>
+        <p:nvSpPr>
+          <p:cNvPr id="5" name="Footer Placeholder 4"/>
+          <p:cNvSpPr>
+            <a:spLocks noGrp="1"/>
+          </p:cNvSpPr>
+          <p:nvPr>
+            <p:ph type="ftr" sz="quarter" idx="11"/>
+          </p:nvPr>
+        </p:nvSpPr>
+        <p:spPr/>
+        <p:txBody>
+          <a:bodyPr/>
+          <a:lstStyle/>
+          <a:p>
+            <a:endParaRPr lang="en-US" dirty="0"/>
+          </a:p>
+        </p:txBody>
+      </p:sp>
+      <p:sp>
+        <p:nvSpPr>
+          <p:cNvPr id="6" name="Slide Number Placeholder 5"/>
+          <p:cNvSpPr>
+            <a:spLocks noGrp="1"/>
+          </p:cNvSpPr>
+          <p:nvPr>
+            <p:ph type="sldNum" sz="quarter" idx="12"/>
+          </p:nvPr>
+        </p:nvSpPr>
+        <p:spPr/>
+        <p:txBody>
+          <a:bodyPr/>
+          <a:lstStyle/>
+          <a:p>
+            <a:fld id="{17E276FA-8F89-B34D-A726-BE3FA1F8DD97}" type="slidenum">
+              <a:rPr lang="en-US" smtClean="0"/>
+              <a:t>22</a:t>
+            </a:fld>
+            <a:endParaRPr lang="en-US" dirty="0"/>
+          </a:p>
+        </p:txBody>
+      </p:sp>
+      <p:sp>
+        <p:nvSpPr>
+          <p:cNvPr id="9" name="Content Placeholder 8"/>
+          <p:cNvSpPr>
+            <a:spLocks noGrp="1"/>
+          </p:cNvSpPr>
+          <p:nvPr>
+            <p:ph idx="1"/>
+          </p:nvPr>
+        </p:nvSpPr>
+        <p:spPr/>
+        <p:txBody>
+          <a:bodyPr/>
+          <a:lstStyle/>
+          <a:p>
+            <a:r>
+              <a:rPr lang="en-US" dirty="0"/>
+              <a:t>Lyra is an interactive environment that enables custom visualization design without writing any code.</a:t>
+            </a:r>
+            <a:endParaRPr lang="en-US" dirty="0"/>
+          </a:p>
+        </p:txBody>
+      </p:sp>
+      <p:pic>
+        <p:nvPicPr>
+          <p:cNvPr id="3" name="Picture 2"/>
+          <p:cNvPicPr>
+            <a:picLocks noChangeAspect="1"/>
+          </p:cNvPicPr>
+          <p:nvPr/>
+        </p:nvPicPr>
+        <p:blipFill>
+          <a:blip r:embed="rId2">
+            <a:extLst>
+              <a:ext uri="{28A0092B-C50C-407E-A947-70E740481C1C}">
+                <a14:useLocalDpi xmlns:a14="http://schemas.microsoft.com/office/drawing/2010/main" val="0"/>
+              </a:ext>
+            </a:extLst>
+          </a:blip>
+          <a:stretch>
+            <a:fillRect/>
+          </a:stretch>
+        </p:blipFill>
+        <p:spPr>
+          <a:xfrm>
+            <a:off x="465996" y="3422921"/>
+            <a:ext cx="8014797" cy="2212744"/>
+          </a:xfrm>
+          <a:prstGeom prst="rect">
+            <a:avLst/>
+          </a:prstGeom>
+        </p:spPr>
+      </p:pic>
+      <p:sp>
+        <p:nvSpPr>
+          <p:cNvPr id="8" name="Rectangle 7"/>
+          <p:cNvSpPr/>
+          <p:nvPr/>
+        </p:nvSpPr>
+        <p:spPr>
+          <a:xfrm>
+            <a:off x="296883" y="3819523"/>
+            <a:ext cx="4132613" cy="435235"/>
+          </a:xfrm>
+          <a:prstGeom prst="rect">
+            <a:avLst/>
+          </a:prstGeom>
+          <a:noFill/>
+          <a:ln w="76200"/>
+        </p:spPr>
+        <p:style>
+          <a:lnRef idx="1">
+            <a:schemeClr val="accent1"/>
+          </a:lnRef>
+          <a:fillRef idx="3">
+            <a:schemeClr val="accent1"/>
+          </a:fillRef>
+          <a:effectRef idx="2">
+            <a:schemeClr val="accent1"/>
+          </a:effectRef>
+          <a:fontRef idx="minor">
+            <a:schemeClr val="lt1"/>
+          </a:fontRef>
+        </p:style>
+        <p:txBody>
+          <a:bodyPr rtlCol="0" anchor="ctr"/>
+          <a:lstStyle/>
+          <a:p>
+            <a:pPr algn="r"/>
+            <a:r>
+              <a:rPr lang="en-US" dirty="0" smtClean="0">
+                <a:solidFill>
+                  <a:schemeClr val="tx1">
+                    <a:lumMod val="85000"/>
+                    <a:lumOff val="15000"/>
+                  </a:schemeClr>
+                </a:solidFill>
+              </a:rPr>
+              <a:t>&lt;- Load your data source</a:t>
+            </a:r>
+            <a:endParaRPr lang="en-US" dirty="0">
+              <a:solidFill>
+                <a:schemeClr val="tx1">
+                  <a:lumMod val="85000"/>
+                  <a:lumOff val="15000"/>
+                </a:schemeClr>
+              </a:solidFill>
+            </a:endParaRPr>
+          </a:p>
+        </p:txBody>
+      </p:sp>
+    </p:spTree>
+    <p:extLst>
+      <p:ext uri="{BB962C8B-B14F-4D97-AF65-F5344CB8AC3E}">
+        <p14:creationId xmlns:p14="http://schemas.microsoft.com/office/powerpoint/2010/main" val="653044473"/>
+      </p:ext>
+    </p:extLst>
+  </p:cSld>
+  <p:clrMapOvr>
+    <a:masterClrMapping/>
+  </p:clrMapOvr>
+  <p:timing>
+    <p:tnLst>
+      <p:par>
+        <p:cTn id="1" dur="indefinite" restart="never" nodeType="tmRoot">
+          <p:childTnLst>
+            <p:seq concurrent="1" nextAc="seek">
+              <p:cTn id="2" dur="indefinite" nodeType="mainSeq">
+                <p:childTnLst>
+                  <p:par>
+                    <p:cTn id="3" fill="hold">
+                      <p:stCondLst>
+                        <p:cond delay="indefinite"/>
+                      </p:stCondLst>
+                      <p:childTnLst>
+                        <p:par>
+                          <p:cTn id="4" fill="hold">
+                            <p:stCondLst>
+                              <p:cond delay="0"/>
+                            </p:stCondLst>
+                            <p:childTnLst>
+                              <p:par>
+                                <p:cTn id="5" presetID="1" presetClass="entr" presetSubtype="0" fill="hold" grpId="0" nodeType="clickEffect">
+                                  <p:stCondLst>
+                                    <p:cond delay="0"/>
+                                  </p:stCondLst>
+                                  <p:childTnLst>
+                                    <p:set>
+                                      <p:cBhvr>
+                                        <p:cTn id="6" dur="1" fill="hold">
+                                          <p:stCondLst>
+                                            <p:cond delay="0"/>
+                                          </p:stCondLst>
+                                        </p:cTn>
+                                        <p:tgtEl>
+                                          <p:spTgt spid="8"/>
+                                        </p:tgtEl>
+                                        <p:attrNameLst>
+                                          <p:attrName>style.visibility</p:attrName>
+                                        </p:attrNameLst>
+                                      </p:cBhvr>
+                                      <p:to>
+                                        <p:strVal val="visible"/>
+                                      </p:to>
+                                    </p:set>
+                                  </p:childTnLst>
+                                </p:cTn>
+                              </p:par>
+                            </p:childTnLst>
+                          </p:cTn>
+                        </p:par>
+                      </p:childTnLst>
+                    </p:cTn>
+                  </p:par>
+                </p:childTnLst>
+              </p:cTn>
+              <p:prevCondLst>
+                <p:cond evt="onPrev" delay="0">
+                  <p:tgtEl>
+                    <p:sldTgt/>
+                  </p:tgtEl>
+                </p:cond>
+              </p:prevCondLst>
+              <p:nextCondLst>
+                <p:cond evt="onNext" delay="0">
+                  <p:tgtEl>
+                    <p:sldTgt/>
+                  </p:tgtEl>
+                </p:cond>
+              </p:nextCondLst>
+            </p:seq>
+          </p:childTnLst>
+        </p:cTn>
+      </p:par>
+    </p:tnLst>
+    <p:bldLst>
+      <p:bldP spid="8" grpId="0" animBg="1"/>
+    </p:bldLst>
+  </p:timing>
+</p:sld>
+</file>
+
+<file path=ppt/slides/slide23.xml><?xml version="1.0" encoding="utf-8"?>
+<p:sld xmlns:a="http://schemas.openxmlformats.org/drawingml/2006/main" xmlns:r="http://schemas.openxmlformats.org/officeDocument/2006/relationships" xmlns:p="http://schemas.openxmlformats.org/presentationml/2006/main">
+  <p:cSld>
+    <p:spTree>
+      <p:nvGrpSpPr>
+        <p:cNvPr id="1" name=""/>
+        <p:cNvGrpSpPr/>
+        <p:nvPr/>
+      </p:nvGrpSpPr>
+      <p:grpSpPr>
+        <a:xfrm>
+          <a:off x="0" y="0"/>
+          <a:ext cx="0" cy="0"/>
+          <a:chOff x="0" y="0"/>
+          <a:chExt cx="0" cy="0"/>
+        </a:xfrm>
+      </p:grpSpPr>
+      <p:sp>
+        <p:nvSpPr>
+          <p:cNvPr id="2" name="Title 1"/>
+          <p:cNvSpPr>
+            <a:spLocks noGrp="1"/>
+          </p:cNvSpPr>
+          <p:nvPr>
+            <p:ph type="title"/>
+          </p:nvPr>
+        </p:nvSpPr>
+        <p:spPr/>
+        <p:txBody>
+          <a:bodyPr/>
+          <a:lstStyle/>
+          <a:p>
+            <a:r>
+              <a:rPr lang="en-US" dirty="0" smtClean="0"/>
+              <a:t>Developing Code</a:t>
+            </a:r>
+            <a:endParaRPr lang="en-US" dirty="0"/>
+          </a:p>
+        </p:txBody>
+      </p:sp>
+      <p:sp>
+        <p:nvSpPr>
+          <p:cNvPr id="4" name="Date Placeholder 3"/>
+          <p:cNvSpPr>
+            <a:spLocks noGrp="1"/>
+          </p:cNvSpPr>
+          <p:nvPr>
+            <p:ph type="dt" sz="half" idx="10"/>
+          </p:nvPr>
+        </p:nvSpPr>
+        <p:spPr/>
+        <p:txBody>
+          <a:bodyPr/>
+          <a:lstStyle/>
+          <a:p>
+            <a:fld id="{7053BEFA-1175-F644-B249-7D41D72BD3FF}" type="datetime1">
+              <a:rPr lang="en-US" smtClean="0"/>
+              <a:t>2/15/17</a:t>
+            </a:fld>
+            <a:endParaRPr lang="en-US"/>
+          </a:p>
+        </p:txBody>
+      </p:sp>
+      <p:sp>
+        <p:nvSpPr>
+          <p:cNvPr id="5" name="Footer Placeholder 4"/>
+          <p:cNvSpPr>
+            <a:spLocks noGrp="1"/>
+          </p:cNvSpPr>
+          <p:nvPr>
+            <p:ph type="ftr" sz="quarter" idx="11"/>
+          </p:nvPr>
+        </p:nvSpPr>
+        <p:spPr/>
+        <p:txBody>
+          <a:bodyPr/>
+          <a:lstStyle/>
+          <a:p>
+            <a:endParaRPr lang="en-US" dirty="0"/>
+          </a:p>
+        </p:txBody>
+      </p:sp>
+      <p:sp>
+        <p:nvSpPr>
+          <p:cNvPr id="6" name="Slide Number Placeholder 5"/>
+          <p:cNvSpPr>
+            <a:spLocks noGrp="1"/>
+          </p:cNvSpPr>
+          <p:nvPr>
+            <p:ph type="sldNum" sz="quarter" idx="12"/>
+          </p:nvPr>
+        </p:nvSpPr>
+        <p:spPr/>
+        <p:txBody>
+          <a:bodyPr/>
+          <a:lstStyle/>
+          <a:p>
+            <a:fld id="{17E276FA-8F89-B34D-A726-BE3FA1F8DD97}" type="slidenum">
+              <a:rPr lang="en-US" smtClean="0"/>
+              <a:t>23</a:t>
+            </a:fld>
+            <a:endParaRPr lang="en-US" dirty="0"/>
+          </a:p>
+        </p:txBody>
+      </p:sp>
+      <p:sp>
+        <p:nvSpPr>
+          <p:cNvPr id="9" name="Content Placeholder 8"/>
+          <p:cNvSpPr>
+            <a:spLocks noGrp="1"/>
+          </p:cNvSpPr>
+          <p:nvPr>
+            <p:ph idx="1"/>
+          </p:nvPr>
+        </p:nvSpPr>
+        <p:spPr/>
+        <p:txBody>
+          <a:bodyPr/>
+          <a:lstStyle/>
+          <a:p>
+            <a:r>
+              <a:rPr lang="en-US" dirty="0"/>
+              <a:t>Lyra is an interactive environment that enables custom visualization design without writing any code</a:t>
+            </a:r>
+            <a:r>
+              <a:rPr lang="en-US" dirty="0" smtClean="0"/>
+              <a:t>.</a:t>
+            </a:r>
+          </a:p>
+          <a:p>
+            <a:r>
+              <a:rPr lang="en-US" dirty="0" smtClean="0"/>
+              <a:t>A great demo at:</a:t>
+            </a:r>
+          </a:p>
+          <a:p>
+            <a:pPr marL="0" indent="0">
+              <a:buNone/>
+            </a:pPr>
+            <a:r>
+              <a:rPr lang="pt-BR" dirty="0" smtClean="0"/>
+              <a:t>		</a:t>
+            </a:r>
+            <a:r>
+              <a:rPr lang="pt-BR" dirty="0" err="1" smtClean="0"/>
+              <a:t>https</a:t>
+            </a:r>
+            <a:r>
+              <a:rPr lang="pt-BR" dirty="0"/>
+              <a:t>://</a:t>
+            </a:r>
+            <a:r>
+              <a:rPr lang="pt-BR" dirty="0" err="1"/>
+              <a:t>vimeo.com</a:t>
+            </a:r>
+            <a:r>
+              <a:rPr lang="pt-BR" dirty="0"/>
+              <a:t>/96104443</a:t>
+            </a:r>
+            <a:endParaRPr lang="en-US" dirty="0"/>
+          </a:p>
+        </p:txBody>
+      </p:sp>
+    </p:spTree>
+    <p:extLst>
+      <p:ext uri="{BB962C8B-B14F-4D97-AF65-F5344CB8AC3E}">
+        <p14:creationId xmlns:p14="http://schemas.microsoft.com/office/powerpoint/2010/main" val="176565563"/>
       </p:ext>
     </p:extLst>
   </p:cSld>

</xml_diff>

<commit_message>
updated byte 3 slides
</commit_message>
<xml_diff>
--- a/Lectures/Byte 3 Mobile Part 2.pptx
+++ b/Lectures/Byte 3 Mobile Part 2.pptx
@@ -241,7 +241,7 @@
           <a:p>
             <a:fld id="{D3AAB66F-B1B7-D045-B4E8-4F60236F228D}" type="datetimeFigureOut">
               <a:rPr lang="en-US" smtClean="0"/>
-              <a:t>2/16/17</a:t>
+              <a:t>2/17/17</a:t>
             </a:fld>
             <a:endParaRPr lang="en-US"/>
           </a:p>
@@ -407,7 +407,7 @@
           <a:p>
             <a:fld id="{BCCF8E76-06A6-164E-A6FA-EC32C13EB232}" type="datetimeFigureOut">
               <a:rPr lang="en-US" smtClean="0"/>
-              <a:t>2/16/17</a:t>
+              <a:t>2/17/17</a:t>
             </a:fld>
             <a:endParaRPr lang="en-US"/>
           </a:p>
@@ -1877,7 +1877,7 @@
             <a:fld id="{FA3C144B-2939-9A49-B014-915EC3E81866}" type="datetime1">
               <a:rPr lang="en-US" smtClean="0"/>
               <a:pPr/>
-              <a:t>2/16/17</a:t>
+              <a:t>2/17/17</a:t>
             </a:fld>
             <a:endParaRPr lang="en-US" dirty="0"/>
           </a:p>
@@ -2306,7 +2306,7 @@
           <a:p>
             <a:fld id="{76838339-A875-5E45-AB3F-AAABD270346A}" type="datetime1">
               <a:rPr lang="en-US" smtClean="0"/>
-              <a:t>2/16/17</a:t>
+              <a:t>2/17/17</a:t>
             </a:fld>
             <a:endParaRPr lang="en-US"/>
           </a:p>
@@ -2592,7 +2592,7 @@
             <a:fld id="{FA3C144B-2939-9A49-B014-915EC3E81866}" type="datetime1">
               <a:rPr lang="en-US" smtClean="0"/>
               <a:pPr/>
-              <a:t>2/16/17</a:t>
+              <a:t>2/17/17</a:t>
             </a:fld>
             <a:endParaRPr lang="en-US" dirty="0"/>
           </a:p>
@@ -3074,7 +3074,7 @@
           <a:p>
             <a:fld id="{A73F672F-A5FB-5745-934A-1BF51CA5539C}" type="datetime1">
               <a:rPr lang="en-US" smtClean="0"/>
-              <a:t>2/16/17</a:t>
+              <a:t>2/17/17</a:t>
             </a:fld>
             <a:endParaRPr lang="en-US"/>
           </a:p>
@@ -3416,7 +3416,7 @@
             <a:fld id="{FA3C144B-2939-9A49-B014-915EC3E81866}" type="datetime1">
               <a:rPr lang="en-US" smtClean="0"/>
               <a:pPr/>
-              <a:t>2/16/17</a:t>
+              <a:t>2/17/17</a:t>
             </a:fld>
             <a:endParaRPr lang="en-US" dirty="0"/>
           </a:p>
@@ -3880,7 +3880,7 @@
           <a:p>
             <a:fld id="{6AFE6A63-5EBE-3E48-B0AE-DF655A1ECE76}" type="datetime1">
               <a:rPr lang="en-US" smtClean="0"/>
-              <a:t>2/16/17</a:t>
+              <a:t>2/17/17</a:t>
             </a:fld>
             <a:endParaRPr lang="en-US"/>
           </a:p>
@@ -4199,7 +4199,7 @@
           <a:p>
             <a:fld id="{4A019F0C-9D18-B54A-9AC9-18AA74EDB034}" type="datetime1">
               <a:rPr lang="en-US" smtClean="0"/>
-              <a:t>2/16/17</a:t>
+              <a:t>2/17/17</a:t>
             </a:fld>
             <a:endParaRPr lang="en-US"/>
           </a:p>
@@ -4509,7 +4509,7 @@
             <a:fld id="{FA3C144B-2939-9A49-B014-915EC3E81866}" type="datetime1">
               <a:rPr lang="en-US" smtClean="0"/>
               <a:pPr/>
-              <a:t>2/16/17</a:t>
+              <a:t>2/17/17</a:t>
             </a:fld>
             <a:endParaRPr lang="en-US" dirty="0"/>
           </a:p>
@@ -4772,7 +4772,7 @@
           <a:p>
             <a:fld id="{FA3C144B-2939-9A49-B014-915EC3E81866}" type="datetime1">
               <a:rPr lang="en-US" smtClean="0"/>
-              <a:t>2/16/17</a:t>
+              <a:t>2/17/17</a:t>
             </a:fld>
             <a:endParaRPr lang="en-US" dirty="0"/>
           </a:p>
@@ -5419,7 +5419,7 @@
           <a:p>
             <a:fld id="{7053BEFA-1175-F644-B249-7D41D72BD3FF}" type="datetime1">
               <a:rPr lang="en-US" smtClean="0"/>
-              <a:t>2/16/17</a:t>
+              <a:t>2/17/17</a:t>
             </a:fld>
             <a:endParaRPr lang="en-US"/>
           </a:p>
@@ -5538,7 +5538,7 @@
             <a:fld id="{FA3C144B-2939-9A49-B014-915EC3E81866}" type="datetime1">
               <a:rPr lang="en-US" smtClean="0"/>
               <a:pPr/>
-              <a:t>2/16/17</a:t>
+              <a:t>2/17/17</a:t>
             </a:fld>
             <a:endParaRPr lang="en-US" dirty="0"/>
           </a:p>
@@ -5755,7 +5755,7 @@
             <a:fld id="{FA3C144B-2939-9A49-B014-915EC3E81866}" type="datetime1">
               <a:rPr lang="en-US" smtClean="0"/>
               <a:pPr/>
-              <a:t>2/16/17</a:t>
+              <a:t>2/17/17</a:t>
             </a:fld>
             <a:endParaRPr lang="en-US" dirty="0"/>
           </a:p>
@@ -6000,7 +6000,7 @@
             <a:fld id="{FA3C144B-2939-9A49-B014-915EC3E81866}" type="datetime1">
               <a:rPr lang="en-US" smtClean="0"/>
               <a:pPr/>
-              <a:t>2/16/17</a:t>
+              <a:t>2/17/17</a:t>
             </a:fld>
             <a:endParaRPr lang="en-US" dirty="0"/>
           </a:p>
@@ -6378,7 +6378,7 @@
           <a:p>
             <a:fld id="{111EEF3B-ABF2-AA4E-9E24-0C6256942674}" type="datetime1">
               <a:rPr lang="en-US" smtClean="0"/>
-              <a:t>2/16/17</a:t>
+              <a:t>2/17/17</a:t>
             </a:fld>
             <a:endParaRPr lang="en-US"/>
           </a:p>
@@ -6542,7 +6542,7 @@
             <a:fld id="{FA3C144B-2939-9A49-B014-915EC3E81866}" type="datetime1">
               <a:rPr lang="en-US" smtClean="0"/>
               <a:pPr/>
-              <a:t>2/16/17</a:t>
+              <a:t>2/17/17</a:t>
             </a:fld>
             <a:endParaRPr lang="en-US" dirty="0"/>
           </a:p>
@@ -6959,7 +6959,7 @@
             <a:fld id="{FA3C144B-2939-9A49-B014-915EC3E81866}" type="datetime1">
               <a:rPr lang="en-US" smtClean="0"/>
               <a:pPr/>
-              <a:t>2/16/17</a:t>
+              <a:t>2/17/17</a:t>
             </a:fld>
             <a:endParaRPr lang="en-US" dirty="0"/>
           </a:p>
@@ -7275,7 +7275,7 @@
             <a:fld id="{FA3C144B-2939-9A49-B014-915EC3E81866}" type="datetime1">
               <a:rPr lang="en-US" smtClean="0"/>
               <a:pPr/>
-              <a:t>2/16/17</a:t>
+              <a:t>2/17/17</a:t>
             </a:fld>
             <a:endParaRPr lang="en-US" dirty="0"/>
           </a:p>
@@ -7941,7 +7941,7 @@
             <a:fld id="{FA3C144B-2939-9A49-B014-915EC3E81866}" type="datetime1">
               <a:rPr lang="en-US" smtClean="0"/>
               <a:pPr/>
-              <a:t>2/16/17</a:t>
+              <a:t>2/17/17</a:t>
             </a:fld>
             <a:endParaRPr lang="en-US" dirty="0"/>
           </a:p>
@@ -8226,7 +8226,7 @@
           <a:effectLst/>
           <a:extLst>
             <a:ext uri="{91240B29-F687-4f45-9708-019B960494DF}">
-              <a14:hiddenLine xmlns:a14="http://schemas.microsoft.com/office/drawing/2010/main" xmlns="" w="9525">
+              <a14:hiddenLine xmlns="" xmlns:a14="http://schemas.microsoft.com/office/drawing/2010/main" w="9525">
                 <a:solidFill>
                   <a:srgbClr val="000000"/>
                 </a:solidFill>
@@ -8236,7 +8236,7 @@
               </a14:hiddenLine>
             </a:ext>
             <a:ext uri="{AF507438-7753-43e0-B8FC-AC1667EBCBE1}">
-              <a14:hiddenEffects xmlns:a14="http://schemas.microsoft.com/office/drawing/2010/main" xmlns="">
+              <a14:hiddenEffects xmlns="" xmlns:a14="http://schemas.microsoft.com/office/drawing/2010/main">
                 <a:effectLst>
                   <a:outerShdw blurRad="40000" dist="23000" dir="5400000" rotWithShape="0">
                     <a:srgbClr val="000000">
@@ -8947,7 +8947,7 @@
           <a:effectLst/>
           <a:extLst>
             <a:ext uri="{91240B29-F687-4f45-9708-019B960494DF}">
-              <a14:hiddenLine xmlns:a14="http://schemas.microsoft.com/office/drawing/2010/main" xmlns="" w="9525">
+              <a14:hiddenLine xmlns="" xmlns:a14="http://schemas.microsoft.com/office/drawing/2010/main" w="9525">
                 <a:solidFill>
                   <a:srgbClr val="000000"/>
                 </a:solidFill>
@@ -8957,7 +8957,7 @@
               </a14:hiddenLine>
             </a:ext>
             <a:ext uri="{AF507438-7753-43e0-B8FC-AC1667EBCBE1}">
-              <a14:hiddenEffects xmlns:a14="http://schemas.microsoft.com/office/drawing/2010/main" xmlns="">
+              <a14:hiddenEffects xmlns="" xmlns:a14="http://schemas.microsoft.com/office/drawing/2010/main">
                 <a:effectLst>
                   <a:outerShdw blurRad="40000" dist="23000" dir="5400000" rotWithShape="0">
                     <a:srgbClr val="000000">
@@ -9132,7 +9132,7 @@
           <a:p>
             <a:fld id="{7053BEFA-1175-F644-B249-7D41D72BD3FF}" type="datetime1">
               <a:rPr lang="en-US" smtClean="0"/>
-              <a:t>2/16/17</a:t>
+              <a:t>2/17/17</a:t>
             </a:fld>
             <a:endParaRPr lang="en-US"/>
           </a:p>
@@ -10270,7 +10270,7 @@
           <a:p>
             <a:fld id="{7053BEFA-1175-F644-B249-7D41D72BD3FF}" type="datetime1">
               <a:rPr lang="en-US" smtClean="0"/>
-              <a:t>2/16/17</a:t>
+              <a:t>2/17/17</a:t>
             </a:fld>
             <a:endParaRPr lang="en-US"/>
           </a:p>
@@ -11448,7 +11448,7 @@
           <a:p>
             <a:fld id="{7053BEFA-1175-F644-B249-7D41D72BD3FF}" type="datetime1">
               <a:rPr lang="en-US" smtClean="0"/>
-              <a:t>2/16/17</a:t>
+              <a:t>2/17/17</a:t>
             </a:fld>
             <a:endParaRPr lang="en-US"/>
           </a:p>
@@ -12629,7 +12629,7 @@
           <a:p>
             <a:fld id="{7053BEFA-1175-F644-B249-7D41D72BD3FF}" type="datetime1">
               <a:rPr lang="en-US" smtClean="0"/>
-              <a:t>2/16/17</a:t>
+              <a:t>2/17/17</a:t>
             </a:fld>
             <a:endParaRPr lang="en-US"/>
           </a:p>
@@ -13584,7 +13584,7 @@
           <a:p>
             <a:fld id="{7053BEFA-1175-F644-B249-7D41D72BD3FF}" type="datetime1">
               <a:rPr lang="en-US" smtClean="0"/>
-              <a:t>2/16/17</a:t>
+              <a:t>2/17/17</a:t>
             </a:fld>
             <a:endParaRPr lang="en-US"/>
           </a:p>
@@ -13746,7 +13746,7 @@
           <a:p>
             <a:fld id="{7053BEFA-1175-F644-B249-7D41D72BD3FF}" type="datetime1">
               <a:rPr lang="en-US" smtClean="0"/>
-              <a:t>2/16/17</a:t>
+              <a:t>2/17/17</a:t>
             </a:fld>
             <a:endParaRPr lang="en-US"/>
           </a:p>
@@ -13914,7 +13914,7 @@
           <a:p>
             <a:fld id="{7053BEFA-1175-F644-B249-7D41D72BD3FF}" type="datetime1">
               <a:rPr lang="en-US" smtClean="0"/>
-              <a:t>2/16/17</a:t>
+              <a:t>2/17/17</a:t>
             </a:fld>
             <a:endParaRPr lang="en-US"/>
           </a:p>
@@ -14039,7 +14039,7 @@
           <a:p>
             <a:fld id="{7053BEFA-1175-F644-B249-7D41D72BD3FF}" type="datetime1">
               <a:rPr lang="en-US" smtClean="0"/>
-              <a:t>2/16/17</a:t>
+              <a:t>2/17/17</a:t>
             </a:fld>
             <a:endParaRPr lang="en-US"/>
           </a:p>
@@ -14223,7 +14223,7 @@
           <a:p>
             <a:fld id="{7053BEFA-1175-F644-B249-7D41D72BD3FF}" type="datetime1">
               <a:rPr lang="en-US" smtClean="0"/>
-              <a:t>2/16/17</a:t>
+              <a:t>2/17/17</a:t>
             </a:fld>
             <a:endParaRPr lang="en-US" dirty="0"/>
           </a:p>
@@ -14408,7 +14408,7 @@
           <a:p>
             <a:fld id="{7053BEFA-1175-F644-B249-7D41D72BD3FF}" type="datetime1">
               <a:rPr lang="en-US" smtClean="0"/>
-              <a:t>2/16/17</a:t>
+              <a:t>2/17/17</a:t>
             </a:fld>
             <a:endParaRPr lang="en-US" dirty="0"/>
           </a:p>
@@ -14585,11 +14585,7 @@
           <a:p>
             <a:r>
               <a:rPr lang="en-US" dirty="0" smtClean="0"/>
-              <a:t>Tell </a:t>
-            </a:r>
-            <a:r>
-              <a:rPr lang="en-US" dirty="0" smtClean="0"/>
-              <a:t>a story about your data.</a:t>
+              <a:t>Tell a story about your data.</a:t>
             </a:r>
             <a:endParaRPr lang="en-US" dirty="0"/>
           </a:p>
@@ -14618,7 +14614,7 @@
           <a:p>
             <a:fld id="{7053BEFA-1175-F644-B249-7D41D72BD3FF}" type="datetime1">
               <a:rPr lang="en-US" smtClean="0"/>
-              <a:t>2/16/17</a:t>
+              <a:t>2/17/17</a:t>
             </a:fld>
             <a:endParaRPr lang="en-US"/>
           </a:p>
@@ -14743,7 +14739,7 @@
           <a:p>
             <a:fld id="{7053BEFA-1175-F644-B249-7D41D72BD3FF}" type="datetime1">
               <a:rPr lang="en-US" smtClean="0"/>
-              <a:t>2/16/17</a:t>
+              <a:t>2/17/17</a:t>
             </a:fld>
             <a:endParaRPr lang="en-US"/>
           </a:p>
@@ -14921,7 +14917,7 @@
           <a:p>
             <a:fld id="{7053BEFA-1175-F644-B249-7D41D72BD3FF}" type="datetime1">
               <a:rPr lang="en-US" smtClean="0"/>
-              <a:t>2/16/17</a:t>
+              <a:t>2/17/17</a:t>
             </a:fld>
             <a:endParaRPr lang="en-US"/>
           </a:p>
@@ -15436,7 +15432,7 @@
           <a:p>
             <a:fld id="{7053BEFA-1175-F644-B249-7D41D72BD3FF}" type="datetime1">
               <a:rPr lang="en-US" smtClean="0"/>
-              <a:t>2/16/17</a:t>
+              <a:t>2/17/17</a:t>
             </a:fld>
             <a:endParaRPr lang="en-US"/>
           </a:p>
@@ -15807,7 +15803,7 @@
           <a:p>
             <a:fld id="{7053BEFA-1175-F644-B249-7D41D72BD3FF}" type="datetime1">
               <a:rPr lang="en-US" smtClean="0"/>
-              <a:t>2/16/17</a:t>
+              <a:t>2/17/17</a:t>
             </a:fld>
             <a:endParaRPr lang="en-US"/>
           </a:p>
@@ -16204,7 +16200,7 @@
           <a:p>
             <a:fld id="{7053BEFA-1175-F644-B249-7D41D72BD3FF}" type="datetime1">
               <a:rPr lang="en-US" smtClean="0"/>
-              <a:t>2/16/17</a:t>
+              <a:t>2/17/17</a:t>
             </a:fld>
             <a:endParaRPr lang="en-US"/>
           </a:p>
@@ -16508,7 +16504,7 @@
           <a:p>
             <a:fld id="{7053BEFA-1175-F644-B249-7D41D72BD3FF}" type="datetime1">
               <a:rPr lang="en-US" smtClean="0"/>
-              <a:t>2/16/17</a:t>
+              <a:t>2/17/17</a:t>
             </a:fld>
             <a:endParaRPr lang="en-US"/>
           </a:p>
@@ -16977,7 +16973,7 @@
           <a:p>
             <a:fld id="{7053BEFA-1175-F644-B249-7D41D72BD3FF}" type="datetime1">
               <a:rPr lang="en-US" smtClean="0"/>
-              <a:t>2/16/17</a:t>
+              <a:t>2/17/17</a:t>
             </a:fld>
             <a:endParaRPr lang="en-US"/>
           </a:p>
@@ -17102,7 +17098,7 @@
           <a:p>
             <a:fld id="{7053BEFA-1175-F644-B249-7D41D72BD3FF}" type="datetime1">
               <a:rPr lang="en-US" smtClean="0"/>
-              <a:t>2/16/17</a:t>
+              <a:t>2/17/17</a:t>
             </a:fld>
             <a:endParaRPr lang="en-US"/>
           </a:p>
@@ -17288,7 +17284,7 @@
           <a:p>
             <a:fld id="{7053BEFA-1175-F644-B249-7D41D72BD3FF}" type="datetime1">
               <a:rPr lang="en-US" smtClean="0"/>
-              <a:t>2/16/17</a:t>
+              <a:t>2/17/17</a:t>
             </a:fld>
             <a:endParaRPr lang="en-US"/>
           </a:p>
@@ -17811,7 +17807,7 @@
           <a:p>
             <a:fld id="{7053BEFA-1175-F644-B249-7D41D72BD3FF}" type="datetime1">
               <a:rPr lang="en-US" smtClean="0"/>
-              <a:t>2/16/17</a:t>
+              <a:t>2/17/17</a:t>
             </a:fld>
             <a:endParaRPr lang="en-US"/>
           </a:p>
@@ -17992,7 +17988,7 @@
           <a:p>
             <a:fld id="{7053BEFA-1175-F644-B249-7D41D72BD3FF}" type="datetime1">
               <a:rPr lang="en-US" smtClean="0"/>
-              <a:t>2/16/17</a:t>
+              <a:t>2/17/17</a:t>
             </a:fld>
             <a:endParaRPr lang="en-US"/>
           </a:p>
@@ -18142,7 +18138,7 @@
           <a:p>
             <a:fld id="{7053BEFA-1175-F644-B249-7D41D72BD3FF}" type="datetime1">
               <a:rPr lang="en-US" smtClean="0"/>
-              <a:t>2/16/17</a:t>
+              <a:t>2/17/17</a:t>
             </a:fld>
             <a:endParaRPr lang="en-US"/>
           </a:p>
@@ -18448,7 +18444,7 @@
           <a:p>
             <a:fld id="{7053BEFA-1175-F644-B249-7D41D72BD3FF}" type="datetime1">
               <a:rPr lang="en-US" smtClean="0"/>
-              <a:t>2/16/17</a:t>
+              <a:t>2/17/17</a:t>
             </a:fld>
             <a:endParaRPr lang="en-US"/>
           </a:p>
@@ -18681,7 +18677,7 @@
           <a:p>
             <a:fld id="{7053BEFA-1175-F644-B249-7D41D72BD3FF}" type="datetime1">
               <a:rPr lang="en-US" smtClean="0"/>
-              <a:t>2/16/17</a:t>
+              <a:t>2/17/17</a:t>
             </a:fld>
             <a:endParaRPr lang="en-US"/>
           </a:p>
@@ -18865,7 +18861,7 @@
           <a:p>
             <a:fld id="{7053BEFA-1175-F644-B249-7D41D72BD3FF}" type="datetime1">
               <a:rPr lang="en-US" smtClean="0"/>
-              <a:t>2/16/17</a:t>
+              <a:t>2/17/17</a:t>
             </a:fld>
             <a:endParaRPr lang="en-US" dirty="0"/>
           </a:p>
@@ -19060,7 +19056,7 @@
           <a:p>
             <a:fld id="{7053BEFA-1175-F644-B249-7D41D72BD3FF}" type="datetime1">
               <a:rPr lang="en-US" smtClean="0"/>
-              <a:t>2/16/17</a:t>
+              <a:t>2/17/17</a:t>
             </a:fld>
             <a:endParaRPr lang="en-US" dirty="0"/>
           </a:p>
@@ -19190,7 +19186,7 @@
           <a:p>
             <a:fld id="{7053BEFA-1175-F644-B249-7D41D72BD3FF}" type="datetime1">
               <a:rPr lang="en-US" smtClean="0"/>
-              <a:t>2/16/17</a:t>
+              <a:t>2/17/17</a:t>
             </a:fld>
             <a:endParaRPr lang="en-US"/>
           </a:p>
@@ -19458,7 +19454,7 @@
           <a:p>
             <a:fld id="{7053BEFA-1175-F644-B249-7D41D72BD3FF}" type="datetime1">
               <a:rPr lang="en-US" smtClean="0"/>
-              <a:t>2/16/17</a:t>
+              <a:t>2/17/17</a:t>
             </a:fld>
             <a:endParaRPr lang="en-US"/>
           </a:p>
@@ -20099,7 +20095,7 @@
           <a:p>
             <a:fld id="{7053BEFA-1175-F644-B249-7D41D72BD3FF}" type="datetime1">
               <a:rPr lang="en-US" smtClean="0"/>
-              <a:t>2/16/17</a:t>
+              <a:t>2/17/17</a:t>
             </a:fld>
             <a:endParaRPr lang="en-US"/>
           </a:p>

</xml_diff>

<commit_message>
Added Iterative Design lecture. Fixed up Project 1.
</commit_message>
<xml_diff>
--- a/Lectures/Byte 3 Mobile Part 2.pptx
+++ b/Lectures/Byte 3 Mobile Part 2.pptx
@@ -5,10 +5,10 @@
     <p:sldMasterId id="2147483648" r:id="rId1"/>
   </p:sldMasterIdLst>
   <p:notesMasterIdLst>
-    <p:notesMasterId r:id="rId25"/>
+    <p:notesMasterId r:id="rId26"/>
   </p:notesMasterIdLst>
   <p:handoutMasterIdLst>
-    <p:handoutMasterId r:id="rId26"/>
+    <p:handoutMasterId r:id="rId27"/>
   </p:handoutMasterIdLst>
   <p:sldIdLst>
     <p:sldId id="256" r:id="rId2"/>
@@ -32,8 +32,9 @@
     <p:sldId id="349" r:id="rId20"/>
     <p:sldId id="350" r:id="rId21"/>
     <p:sldId id="351" r:id="rId22"/>
-    <p:sldId id="352" r:id="rId23"/>
-    <p:sldId id="353" r:id="rId24"/>
+    <p:sldId id="354" r:id="rId23"/>
+    <p:sldId id="352" r:id="rId24"/>
+    <p:sldId id="353" r:id="rId25"/>
   </p:sldIdLst>
   <p:sldSz cx="9144000" cy="6858000" type="screen4x3"/>
   <p:notesSz cx="6858000" cy="9144000"/>
@@ -233,7 +234,7 @@
           <a:p>
             <a:fld id="{D3AAB66F-B1B7-D045-B4E8-4F60236F228D}" type="datetimeFigureOut">
               <a:rPr lang="en-US" smtClean="0"/>
-              <a:t>2/15/17</a:t>
+              <a:t>2/21/17</a:t>
             </a:fld>
             <a:endParaRPr lang="en-US"/>
           </a:p>
@@ -399,7 +400,7 @@
           <a:p>
             <a:fld id="{BCCF8E76-06A6-164E-A6FA-EC32C13EB232}" type="datetimeFigureOut">
               <a:rPr lang="en-US" smtClean="0"/>
-              <a:t>2/15/17</a:t>
+              <a:t>2/21/17</a:t>
             </a:fld>
             <a:endParaRPr lang="en-US"/>
           </a:p>
@@ -1869,7 +1870,7 @@
             <a:fld id="{FA3C144B-2939-9A49-B014-915EC3E81866}" type="datetime1">
               <a:rPr lang="en-US" smtClean="0"/>
               <a:pPr/>
-              <a:t>2/15/17</a:t>
+              <a:t>2/21/17</a:t>
             </a:fld>
             <a:endParaRPr lang="en-US" dirty="0"/>
           </a:p>
@@ -2298,7 +2299,7 @@
           <a:p>
             <a:fld id="{76838339-A875-5E45-AB3F-AAABD270346A}" type="datetime1">
               <a:rPr lang="en-US" smtClean="0"/>
-              <a:t>2/15/17</a:t>
+              <a:t>2/21/17</a:t>
             </a:fld>
             <a:endParaRPr lang="en-US"/>
           </a:p>
@@ -2584,7 +2585,7 @@
             <a:fld id="{FA3C144B-2939-9A49-B014-915EC3E81866}" type="datetime1">
               <a:rPr lang="en-US" smtClean="0"/>
               <a:pPr/>
-              <a:t>2/15/17</a:t>
+              <a:t>2/21/17</a:t>
             </a:fld>
             <a:endParaRPr lang="en-US" dirty="0"/>
           </a:p>
@@ -3066,7 +3067,7 @@
           <a:p>
             <a:fld id="{A73F672F-A5FB-5745-934A-1BF51CA5539C}" type="datetime1">
               <a:rPr lang="en-US" smtClean="0"/>
-              <a:t>2/15/17</a:t>
+              <a:t>2/21/17</a:t>
             </a:fld>
             <a:endParaRPr lang="en-US"/>
           </a:p>
@@ -3408,7 +3409,7 @@
             <a:fld id="{FA3C144B-2939-9A49-B014-915EC3E81866}" type="datetime1">
               <a:rPr lang="en-US" smtClean="0"/>
               <a:pPr/>
-              <a:t>2/15/17</a:t>
+              <a:t>2/21/17</a:t>
             </a:fld>
             <a:endParaRPr lang="en-US" dirty="0"/>
           </a:p>
@@ -3872,7 +3873,7 @@
           <a:p>
             <a:fld id="{6AFE6A63-5EBE-3E48-B0AE-DF655A1ECE76}" type="datetime1">
               <a:rPr lang="en-US" smtClean="0"/>
-              <a:t>2/15/17</a:t>
+              <a:t>2/21/17</a:t>
             </a:fld>
             <a:endParaRPr lang="en-US"/>
           </a:p>
@@ -4191,7 +4192,7 @@
           <a:p>
             <a:fld id="{4A019F0C-9D18-B54A-9AC9-18AA74EDB034}" type="datetime1">
               <a:rPr lang="en-US" smtClean="0"/>
-              <a:t>2/15/17</a:t>
+              <a:t>2/21/17</a:t>
             </a:fld>
             <a:endParaRPr lang="en-US"/>
           </a:p>
@@ -4501,7 +4502,7 @@
             <a:fld id="{FA3C144B-2939-9A49-B014-915EC3E81866}" type="datetime1">
               <a:rPr lang="en-US" smtClean="0"/>
               <a:pPr/>
-              <a:t>2/15/17</a:t>
+              <a:t>2/21/17</a:t>
             </a:fld>
             <a:endParaRPr lang="en-US" dirty="0"/>
           </a:p>
@@ -4764,7 +4765,7 @@
           <a:p>
             <a:fld id="{FA3C144B-2939-9A49-B014-915EC3E81866}" type="datetime1">
               <a:rPr lang="en-US" smtClean="0"/>
-              <a:t>2/15/17</a:t>
+              <a:t>2/21/17</a:t>
             </a:fld>
             <a:endParaRPr lang="en-US" dirty="0"/>
           </a:p>
@@ -5411,7 +5412,7 @@
           <a:p>
             <a:fld id="{7053BEFA-1175-F644-B249-7D41D72BD3FF}" type="datetime1">
               <a:rPr lang="en-US" smtClean="0"/>
-              <a:t>2/15/17</a:t>
+              <a:t>2/21/17</a:t>
             </a:fld>
             <a:endParaRPr lang="en-US"/>
           </a:p>
@@ -5530,7 +5531,7 @@
             <a:fld id="{FA3C144B-2939-9A49-B014-915EC3E81866}" type="datetime1">
               <a:rPr lang="en-US" smtClean="0"/>
               <a:pPr/>
-              <a:t>2/15/17</a:t>
+              <a:t>2/21/17</a:t>
             </a:fld>
             <a:endParaRPr lang="en-US" dirty="0"/>
           </a:p>
@@ -5747,7 +5748,7 @@
             <a:fld id="{FA3C144B-2939-9A49-B014-915EC3E81866}" type="datetime1">
               <a:rPr lang="en-US" smtClean="0"/>
               <a:pPr/>
-              <a:t>2/15/17</a:t>
+              <a:t>2/21/17</a:t>
             </a:fld>
             <a:endParaRPr lang="en-US" dirty="0"/>
           </a:p>
@@ -5992,7 +5993,7 @@
             <a:fld id="{FA3C144B-2939-9A49-B014-915EC3E81866}" type="datetime1">
               <a:rPr lang="en-US" smtClean="0"/>
               <a:pPr/>
-              <a:t>2/15/17</a:t>
+              <a:t>2/21/17</a:t>
             </a:fld>
             <a:endParaRPr lang="en-US" dirty="0"/>
           </a:p>
@@ -6370,7 +6371,7 @@
           <a:p>
             <a:fld id="{111EEF3B-ABF2-AA4E-9E24-0C6256942674}" type="datetime1">
               <a:rPr lang="en-US" smtClean="0"/>
-              <a:t>2/15/17</a:t>
+              <a:t>2/21/17</a:t>
             </a:fld>
             <a:endParaRPr lang="en-US"/>
           </a:p>
@@ -6534,7 +6535,7 @@
             <a:fld id="{FA3C144B-2939-9A49-B014-915EC3E81866}" type="datetime1">
               <a:rPr lang="en-US" smtClean="0"/>
               <a:pPr/>
-              <a:t>2/15/17</a:t>
+              <a:t>2/21/17</a:t>
             </a:fld>
             <a:endParaRPr lang="en-US" dirty="0"/>
           </a:p>
@@ -6951,7 +6952,7 @@
             <a:fld id="{FA3C144B-2939-9A49-B014-915EC3E81866}" type="datetime1">
               <a:rPr lang="en-US" smtClean="0"/>
               <a:pPr/>
-              <a:t>2/15/17</a:t>
+              <a:t>2/21/17</a:t>
             </a:fld>
             <a:endParaRPr lang="en-US" dirty="0"/>
           </a:p>
@@ -7267,7 +7268,7 @@
             <a:fld id="{FA3C144B-2939-9A49-B014-915EC3E81866}" type="datetime1">
               <a:rPr lang="en-US" smtClean="0"/>
               <a:pPr/>
-              <a:t>2/15/17</a:t>
+              <a:t>2/21/17</a:t>
             </a:fld>
             <a:endParaRPr lang="en-US" dirty="0"/>
           </a:p>
@@ -7933,7 +7934,7 @@
             <a:fld id="{FA3C144B-2939-9A49-B014-915EC3E81866}" type="datetime1">
               <a:rPr lang="en-US" smtClean="0"/>
               <a:pPr/>
-              <a:t>2/15/17</a:t>
+              <a:t>2/21/17</a:t>
             </a:fld>
             <a:endParaRPr lang="en-US" dirty="0"/>
           </a:p>
@@ -8218,7 +8219,7 @@
           <a:effectLst/>
           <a:extLst>
             <a:ext uri="{91240B29-F687-4f45-9708-019B960494DF}">
-              <a14:hiddenLine xmlns:a14="http://schemas.microsoft.com/office/drawing/2010/main" xmlns="" w="9525">
+              <a14:hiddenLine xmlns="" xmlns:a14="http://schemas.microsoft.com/office/drawing/2010/main" w="9525">
                 <a:solidFill>
                   <a:srgbClr val="000000"/>
                 </a:solidFill>
@@ -8228,7 +8229,7 @@
               </a14:hiddenLine>
             </a:ext>
             <a:ext uri="{AF507438-7753-43e0-B8FC-AC1667EBCBE1}">
-              <a14:hiddenEffects xmlns:a14="http://schemas.microsoft.com/office/drawing/2010/main" xmlns="">
+              <a14:hiddenEffects xmlns="" xmlns:a14="http://schemas.microsoft.com/office/drawing/2010/main">
                 <a:effectLst>
                   <a:outerShdw blurRad="40000" dist="23000" dir="5400000" rotWithShape="0">
                     <a:srgbClr val="000000">
@@ -8939,7 +8940,7 @@
           <a:effectLst/>
           <a:extLst>
             <a:ext uri="{91240B29-F687-4f45-9708-019B960494DF}">
-              <a14:hiddenLine xmlns:a14="http://schemas.microsoft.com/office/drawing/2010/main" xmlns="" w="9525">
+              <a14:hiddenLine xmlns="" xmlns:a14="http://schemas.microsoft.com/office/drawing/2010/main" w="9525">
                 <a:solidFill>
                   <a:srgbClr val="000000"/>
                 </a:solidFill>
@@ -8949,7 +8950,7 @@
               </a14:hiddenLine>
             </a:ext>
             <a:ext uri="{AF507438-7753-43e0-B8FC-AC1667EBCBE1}">
-              <a14:hiddenEffects xmlns:a14="http://schemas.microsoft.com/office/drawing/2010/main" xmlns="">
+              <a14:hiddenEffects xmlns="" xmlns:a14="http://schemas.microsoft.com/office/drawing/2010/main">
                 <a:effectLst>
                   <a:outerShdw blurRad="40000" dist="23000" dir="5400000" rotWithShape="0">
                     <a:srgbClr val="000000">
@@ -9050,7 +9051,7 @@
           <a:p>
             <a:fld id="{7053BEFA-1175-F644-B249-7D41D72BD3FF}" type="datetime1">
               <a:rPr lang="en-US" smtClean="0"/>
-              <a:t>2/15/17</a:t>
+              <a:t>2/21/17</a:t>
             </a:fld>
             <a:endParaRPr lang="en-US"/>
           </a:p>
@@ -9234,7 +9235,7 @@
           <a:p>
             <a:fld id="{7053BEFA-1175-F644-B249-7D41D72BD3FF}" type="datetime1">
               <a:rPr lang="en-US" smtClean="0"/>
-              <a:t>2/15/17</a:t>
+              <a:t>2/21/17</a:t>
             </a:fld>
             <a:endParaRPr lang="en-US" dirty="0"/>
           </a:p>
@@ -9419,7 +9420,7 @@
           <a:p>
             <a:fld id="{7053BEFA-1175-F644-B249-7D41D72BD3FF}" type="datetime1">
               <a:rPr lang="en-US" smtClean="0"/>
-              <a:t>2/15/17</a:t>
+              <a:t>2/21/17</a:t>
             </a:fld>
             <a:endParaRPr lang="en-US" dirty="0"/>
           </a:p>
@@ -9596,7 +9597,7 @@
           <a:p>
             <a:fld id="{7053BEFA-1175-F644-B249-7D41D72BD3FF}" type="datetime1">
               <a:rPr lang="en-US" smtClean="0"/>
-              <a:t>2/15/17</a:t>
+              <a:t>2/21/17</a:t>
             </a:fld>
             <a:endParaRPr lang="en-US"/>
           </a:p>
@@ -9774,7 +9775,7 @@
           <a:p>
             <a:fld id="{7053BEFA-1175-F644-B249-7D41D72BD3FF}" type="datetime1">
               <a:rPr lang="en-US" smtClean="0"/>
-              <a:t>2/15/17</a:t>
+              <a:t>2/21/17</a:t>
             </a:fld>
             <a:endParaRPr lang="en-US"/>
           </a:p>
@@ -10289,7 +10290,7 @@
           <a:p>
             <a:fld id="{7053BEFA-1175-F644-B249-7D41D72BD3FF}" type="datetime1">
               <a:rPr lang="en-US" smtClean="0"/>
-              <a:t>2/15/17</a:t>
+              <a:t>2/21/17</a:t>
             </a:fld>
             <a:endParaRPr lang="en-US"/>
           </a:p>
@@ -10660,7 +10661,7 @@
           <a:p>
             <a:fld id="{7053BEFA-1175-F644-B249-7D41D72BD3FF}" type="datetime1">
               <a:rPr lang="en-US" smtClean="0"/>
-              <a:t>2/15/17</a:t>
+              <a:t>2/21/17</a:t>
             </a:fld>
             <a:endParaRPr lang="en-US"/>
           </a:p>
@@ -11057,7 +11058,7 @@
           <a:p>
             <a:fld id="{7053BEFA-1175-F644-B249-7D41D72BD3FF}" type="datetime1">
               <a:rPr lang="en-US" smtClean="0"/>
-              <a:t>2/15/17</a:t>
+              <a:t>2/21/17</a:t>
             </a:fld>
             <a:endParaRPr lang="en-US"/>
           </a:p>
@@ -11361,7 +11362,7 @@
           <a:p>
             <a:fld id="{7053BEFA-1175-F644-B249-7D41D72BD3FF}" type="datetime1">
               <a:rPr lang="en-US" smtClean="0"/>
-              <a:t>2/15/17</a:t>
+              <a:t>2/21/17</a:t>
             </a:fld>
             <a:endParaRPr lang="en-US"/>
           </a:p>
@@ -11517,6 +11518,36 @@
           </a:p>
         </p:txBody>
       </p:sp>
+      <p:pic>
+        <p:nvPicPr>
+          <p:cNvPr id="7" name="Picture 6"/>
+          <p:cNvPicPr>
+            <a:picLocks noChangeAspect="1"/>
+          </p:cNvPicPr>
+          <p:nvPr/>
+        </p:nvPicPr>
+        <p:blipFill>
+          <a:blip r:embed="rId3">
+            <a:extLst>
+              <a:ext uri="{28A0092B-C50C-407E-A947-70E740481C1C}">
+                <a14:useLocalDpi xmlns:a14="http://schemas.microsoft.com/office/drawing/2010/main" val="0"/>
+              </a:ext>
+            </a:extLst>
+          </a:blip>
+          <a:stretch>
+            <a:fillRect/>
+          </a:stretch>
+        </p:blipFill>
+        <p:spPr>
+          <a:xfrm>
+            <a:off x="-164528" y="4643176"/>
+            <a:ext cx="8559800" cy="787400"/>
+          </a:xfrm>
+          <a:prstGeom prst="rect">
+            <a:avLst/>
+          </a:prstGeom>
+        </p:spPr>
+      </p:pic>
     </p:spTree>
     <p:extLst>
       <p:ext uri="{BB962C8B-B14F-4D97-AF65-F5344CB8AC3E}">
@@ -11580,6 +11611,51 @@
                       </p:childTnLst>
                     </p:cTn>
                   </p:par>
+                  <p:par>
+                    <p:cTn id="7" fill="hold">
+                      <p:stCondLst>
+                        <p:cond delay="indefinite"/>
+                      </p:stCondLst>
+                      <p:childTnLst>
+                        <p:par>
+                          <p:cTn id="8" fill="hold">
+                            <p:stCondLst>
+                              <p:cond delay="0"/>
+                            </p:stCondLst>
+                            <p:childTnLst>
+                              <p:par>
+                                <p:cTn id="9" presetID="1" presetClass="entr" presetSubtype="0" fill="hold" nodeType="clickEffect">
+                                  <p:stCondLst>
+                                    <p:cond delay="0"/>
+                                  </p:stCondLst>
+                                  <p:childTnLst>
+                                    <p:set>
+                                      <p:cBhvr>
+                                        <p:cTn id="10" dur="1" fill="hold">
+                                          <p:stCondLst>
+                                            <p:cond delay="0"/>
+                                          </p:stCondLst>
+                                        </p:cTn>
+                                        <p:tgtEl>
+                                          <p:spTgt spid="7"/>
+                                        </p:tgtEl>
+                                        <p:attrNameLst>
+                                          <p:attrName>style.visibility</p:attrName>
+                                        </p:attrNameLst>
+                                      </p:cBhvr>
+                                      <p:to>
+                                        <p:strVal val="visible"/>
+                                      </p:to>
+                                    </p:set>
+                                  </p:childTnLst>
+                                </p:cTn>
+                              </p:par>
+                            </p:childTnLst>
+                          </p:cTn>
+                        </p:par>
+                      </p:childTnLst>
+                    </p:cTn>
+                  </p:par>
                 </p:childTnLst>
               </p:cTn>
               <p:prevCondLst>
@@ -11665,7 +11741,7 @@
           <a:p>
             <a:fld id="{7053BEFA-1175-F644-B249-7D41D72BD3FF}" type="datetime1">
               <a:rPr lang="en-US" smtClean="0"/>
-              <a:t>2/15/17</a:t>
+              <a:t>2/21/17</a:t>
             </a:fld>
             <a:endParaRPr lang="en-US"/>
           </a:p>
@@ -11865,7 +11941,6 @@
               <a:rPr lang="en-US" dirty="0" smtClean="0"/>
               <a:t>Now what?</a:t>
             </a:r>
-            <a:endParaRPr lang="en-US" dirty="0" smtClean="0"/>
           </a:p>
         </p:txBody>
       </p:sp>
@@ -11886,7 +11961,7 @@
           <a:p>
             <a:fld id="{7053BEFA-1175-F644-B249-7D41D72BD3FF}" type="datetime1">
               <a:rPr lang="en-US" smtClean="0"/>
-              <a:t>2/15/17</a:t>
+              <a:t>2/21/17</a:t>
             </a:fld>
             <a:endParaRPr lang="en-US" dirty="0"/>
           </a:p>
@@ -12011,7 +12086,7 @@
           <a:p>
             <a:fld id="{7053BEFA-1175-F644-B249-7D41D72BD3FF}" type="datetime1">
               <a:rPr lang="en-US" smtClean="0"/>
-              <a:t>2/15/17</a:t>
+              <a:t>2/21/17</a:t>
             </a:fld>
             <a:endParaRPr lang="en-US"/>
           </a:p>
@@ -12534,7 +12609,7 @@
           <a:p>
             <a:fld id="{7053BEFA-1175-F644-B249-7D41D72BD3FF}" type="datetime1">
               <a:rPr lang="en-US" smtClean="0"/>
-              <a:t>2/15/17</a:t>
+              <a:t>2/21/17</a:t>
             </a:fld>
             <a:endParaRPr lang="en-US"/>
           </a:p>
@@ -12710,7 +12785,7 @@
           <a:p>
             <a:fld id="{7053BEFA-1175-F644-B249-7D41D72BD3FF}" type="datetime1">
               <a:rPr lang="en-US" smtClean="0"/>
-              <a:t>2/15/17</a:t>
+              <a:t>2/21/17</a:t>
             </a:fld>
             <a:endParaRPr lang="en-US"/>
           </a:p>
@@ -12774,10 +12849,157 @@
           <a:lstStyle/>
           <a:p>
             <a:r>
+              <a:rPr lang="en-US" smtClean="0"/>
+              <a:t>What is MVC?</a:t>
+            </a:r>
+            <a:endParaRPr lang="en-US" dirty="0"/>
+          </a:p>
+        </p:txBody>
+      </p:sp>
+    </p:spTree>
+    <p:extLst>
+      <p:ext uri="{BB962C8B-B14F-4D97-AF65-F5344CB8AC3E}">
+        <p14:creationId xmlns:p14="http://schemas.microsoft.com/office/powerpoint/2010/main" val="369656114"/>
+      </p:ext>
+    </p:extLst>
+  </p:cSld>
+  <p:clrMapOvr>
+    <a:masterClrMapping/>
+  </p:clrMapOvr>
+  <p:timing>
+    <p:tnLst>
+      <p:par>
+        <p:cTn id="1" dur="indefinite" restart="never" nodeType="tmRoot"/>
+      </p:par>
+    </p:tnLst>
+  </p:timing>
+</p:sld>
+</file>
+
+<file path=ppt/slides/slide23.xml><?xml version="1.0" encoding="utf-8"?>
+<p:sld xmlns:a="http://schemas.openxmlformats.org/drawingml/2006/main" xmlns:r="http://schemas.openxmlformats.org/officeDocument/2006/relationships" xmlns:p="http://schemas.openxmlformats.org/presentationml/2006/main">
+  <p:cSld>
+    <p:spTree>
+      <p:nvGrpSpPr>
+        <p:cNvPr id="1" name=""/>
+        <p:cNvGrpSpPr/>
+        <p:nvPr/>
+      </p:nvGrpSpPr>
+      <p:grpSpPr>
+        <a:xfrm>
+          <a:off x="0" y="0"/>
+          <a:ext cx="0" cy="0"/>
+          <a:chOff x="0" y="0"/>
+          <a:chExt cx="0" cy="0"/>
+        </a:xfrm>
+      </p:grpSpPr>
+      <p:sp>
+        <p:nvSpPr>
+          <p:cNvPr id="2" name="Title 1"/>
+          <p:cNvSpPr>
+            <a:spLocks noGrp="1"/>
+          </p:cNvSpPr>
+          <p:nvPr>
+            <p:ph type="title"/>
+          </p:nvPr>
+        </p:nvSpPr>
+        <p:spPr/>
+        <p:txBody>
+          <a:bodyPr/>
+          <a:lstStyle/>
+          <a:p>
+            <a:r>
+              <a:rPr lang="en-US" dirty="0" smtClean="0"/>
+              <a:t>Developing Code</a:t>
+            </a:r>
+            <a:endParaRPr lang="en-US" dirty="0"/>
+          </a:p>
+        </p:txBody>
+      </p:sp>
+      <p:sp>
+        <p:nvSpPr>
+          <p:cNvPr id="4" name="Date Placeholder 3"/>
+          <p:cNvSpPr>
+            <a:spLocks noGrp="1"/>
+          </p:cNvSpPr>
+          <p:nvPr>
+            <p:ph type="dt" sz="half" idx="10"/>
+          </p:nvPr>
+        </p:nvSpPr>
+        <p:spPr/>
+        <p:txBody>
+          <a:bodyPr/>
+          <a:lstStyle/>
+          <a:p>
+            <a:fld id="{7053BEFA-1175-F644-B249-7D41D72BD3FF}" type="datetime1">
+              <a:rPr lang="en-US" smtClean="0"/>
+              <a:t>2/21/17</a:t>
+            </a:fld>
+            <a:endParaRPr lang="en-US"/>
+          </a:p>
+        </p:txBody>
+      </p:sp>
+      <p:sp>
+        <p:nvSpPr>
+          <p:cNvPr id="5" name="Footer Placeholder 4"/>
+          <p:cNvSpPr>
+            <a:spLocks noGrp="1"/>
+          </p:cNvSpPr>
+          <p:nvPr>
+            <p:ph type="ftr" sz="quarter" idx="11"/>
+          </p:nvPr>
+        </p:nvSpPr>
+        <p:spPr/>
+        <p:txBody>
+          <a:bodyPr/>
+          <a:lstStyle/>
+          <a:p>
+            <a:endParaRPr lang="en-US" dirty="0"/>
+          </a:p>
+        </p:txBody>
+      </p:sp>
+      <p:sp>
+        <p:nvSpPr>
+          <p:cNvPr id="6" name="Slide Number Placeholder 5"/>
+          <p:cNvSpPr>
+            <a:spLocks noGrp="1"/>
+          </p:cNvSpPr>
+          <p:nvPr>
+            <p:ph type="sldNum" sz="quarter" idx="12"/>
+          </p:nvPr>
+        </p:nvSpPr>
+        <p:spPr/>
+        <p:txBody>
+          <a:bodyPr/>
+          <a:lstStyle/>
+          <a:p>
+            <a:fld id="{17E276FA-8F89-B34D-A726-BE3FA1F8DD97}" type="slidenum">
+              <a:rPr lang="en-US" smtClean="0"/>
+              <a:t>23</a:t>
+            </a:fld>
+            <a:endParaRPr lang="en-US" dirty="0"/>
+          </a:p>
+        </p:txBody>
+      </p:sp>
+      <p:sp>
+        <p:nvSpPr>
+          <p:cNvPr id="9" name="Content Placeholder 8"/>
+          <p:cNvSpPr>
+            <a:spLocks noGrp="1"/>
+          </p:cNvSpPr>
+          <p:nvPr>
+            <p:ph idx="1"/>
+          </p:nvPr>
+        </p:nvSpPr>
+        <p:spPr/>
+        <p:txBody>
+          <a:bodyPr/>
+          <a:lstStyle/>
+          <a:p>
+            <a:r>
               <a:rPr lang="en-US" dirty="0"/>
               <a:t>Lyra is an interactive environment that enables custom visualization design without writing any code.</a:t>
             </a:r>
-            <a:endParaRPr lang="en-US" dirty="0"/>
           </a:p>
         </p:txBody>
       </p:sp>
@@ -12960,7 +13182,7 @@
 </p:sld>
 </file>
 
-<file path=ppt/slides/slide23.xml><?xml version="1.0" encoding="utf-8"?>
+<file path=ppt/slides/slide24.xml><?xml version="1.0" encoding="utf-8"?>
 <p:sld xmlns:a="http://schemas.openxmlformats.org/drawingml/2006/main" xmlns:r="http://schemas.openxmlformats.org/officeDocument/2006/relationships" xmlns:p="http://schemas.openxmlformats.org/presentationml/2006/main">
   <p:cSld>
     <p:spTree>
@@ -13017,7 +13239,7 @@
           <a:p>
             <a:fld id="{7053BEFA-1175-F644-B249-7D41D72BD3FF}" type="datetime1">
               <a:rPr lang="en-US" smtClean="0"/>
-              <a:t>2/15/17</a:t>
+              <a:t>2/21/17</a:t>
             </a:fld>
             <a:endParaRPr lang="en-US"/>
           </a:p>
@@ -13059,7 +13281,7 @@
           <a:p>
             <a:fld id="{17E276FA-8F89-B34D-A726-BE3FA1F8DD97}" type="slidenum">
               <a:rPr lang="en-US" smtClean="0"/>
-              <a:t>23</a:t>
+              <a:t>24</a:t>
             </a:fld>
             <a:endParaRPr lang="en-US" dirty="0"/>
           </a:p>
@@ -13205,7 +13427,7 @@
           <a:p>
             <a:fld id="{7053BEFA-1175-F644-B249-7D41D72BD3FF}" type="datetime1">
               <a:rPr lang="en-US" smtClean="0"/>
-              <a:t>2/15/17</a:t>
+              <a:t>2/21/17</a:t>
             </a:fld>
             <a:endParaRPr lang="en-US"/>
           </a:p>
@@ -13473,7 +13695,7 @@
           <a:p>
             <a:fld id="{7053BEFA-1175-F644-B249-7D41D72BD3FF}" type="datetime1">
               <a:rPr lang="en-US" smtClean="0"/>
-              <a:t>2/15/17</a:t>
+              <a:t>2/21/17</a:t>
             </a:fld>
             <a:endParaRPr lang="en-US"/>
           </a:p>
@@ -14114,7 +14336,7 @@
           <a:p>
             <a:fld id="{7053BEFA-1175-F644-B249-7D41D72BD3FF}" type="datetime1">
               <a:rPr lang="en-US" smtClean="0"/>
-              <a:t>2/15/17</a:t>
+              <a:t>2/21/17</a:t>
             </a:fld>
             <a:endParaRPr lang="en-US"/>
           </a:p>
@@ -14979,7 +15201,7 @@
           <a:p>
             <a:fld id="{7053BEFA-1175-F644-B249-7D41D72BD3FF}" type="datetime1">
               <a:rPr lang="en-US" smtClean="0"/>
-              <a:t>2/15/17</a:t>
+              <a:t>2/21/17</a:t>
             </a:fld>
             <a:endParaRPr lang="en-US"/>
           </a:p>
@@ -16117,7 +16339,7 @@
           <a:p>
             <a:fld id="{7053BEFA-1175-F644-B249-7D41D72BD3FF}" type="datetime1">
               <a:rPr lang="en-US" smtClean="0"/>
-              <a:t>2/15/17</a:t>
+              <a:t>2/21/17</a:t>
             </a:fld>
             <a:endParaRPr lang="en-US"/>
           </a:p>
@@ -17295,7 +17517,7 @@
           <a:p>
             <a:fld id="{7053BEFA-1175-F644-B249-7D41D72BD3FF}" type="datetime1">
               <a:rPr lang="en-US" smtClean="0"/>
-              <a:t>2/15/17</a:t>
+              <a:t>2/21/17</a:t>
             </a:fld>
             <a:endParaRPr lang="en-US"/>
           </a:p>
@@ -18476,7 +18698,7 @@
           <a:p>
             <a:fld id="{7053BEFA-1175-F644-B249-7D41D72BD3FF}" type="datetime1">
               <a:rPr lang="en-US" smtClean="0"/>
-              <a:t>2/15/17</a:t>
+              <a:t>2/21/17</a:t>
             </a:fld>
             <a:endParaRPr lang="en-US"/>
           </a:p>

</xml_diff>